<commit_message>
(T1 리워크)LevelDesign / (Obj 추가, 수정)DB
</commit_message>
<xml_diff>
--- a/Documents/Stage_L.pptx
+++ b/Documents/Stage_L.pptx
@@ -112,7 +112,68 @@
       </a:defRPr>
     </a:lvl9pPr>
   </p:defaultTextStyle>
+  <p:extLst>
+    <p:ext uri="{EFAFB233-063F-42B5-8137-9DF3F51BA10A}">
+      <p15:sldGuideLst xmlns:p15="http://schemas.microsoft.com/office/powerpoint/2012/main">
+        <p15:guide id="1" orient="horz" pos="2161">
+          <p15:clr>
+            <a:srgbClr val="A4A3A4"/>
+          </p15:clr>
+        </p15:guide>
+        <p15:guide id="2" pos="3840">
+          <p15:clr>
+            <a:srgbClr val="A4A3A4"/>
+          </p15:clr>
+        </p15:guide>
+      </p15:sldGuideLst>
+    </p:ext>
+  </p:extLst>
 </p:presentation>
+</file>
+
+<file path=ppt/revisionInfo.xml><?xml version="1.0" encoding="utf-8"?>
+<p1510:revInfo xmlns:a="http://schemas.openxmlformats.org/drawingml/2006/main" xmlns:r="http://schemas.openxmlformats.org/officeDocument/2006/relationships" xmlns:p1510="http://schemas.microsoft.com/office/powerpoint/2015/10/main">
+  <p1510:revLst>
+    <p1510:client id="{FF1AED5E-B4D7-4EF1-A2DB-B2AADAA1F743}" v="2" dt="2022-04-05T09:20:02.711"/>
+  </p1510:revLst>
+</p1510:revInfo>
+</file>
+
+<file path=ppt/changesInfos/changesInfo1.xml><?xml version="1.0" encoding="utf-8"?>
+<pc:chgInfo xmlns:a="http://schemas.openxmlformats.org/drawingml/2006/main" xmlns:r="http://schemas.openxmlformats.org/officeDocument/2006/relationships" xmlns:ac="http://schemas.microsoft.com/office/drawing/2013/main/command" xmlns:pc="http://schemas.microsoft.com/office/powerpoint/2013/main/command">
+  <pc:docChgLst>
+    <pc:chgData name="남 상현" userId="03ad4a8e8f7310f3" providerId="LiveId" clId="{FF1AED5E-B4D7-4EF1-A2DB-B2AADAA1F743}"/>
+    <pc:docChg chg="undo custSel modSld">
+      <pc:chgData name="남 상현" userId="03ad4a8e8f7310f3" providerId="LiveId" clId="{FF1AED5E-B4D7-4EF1-A2DB-B2AADAA1F743}" dt="2022-04-05T09:20:03.059" v="6" actId="1076"/>
+      <pc:docMkLst>
+        <pc:docMk/>
+      </pc:docMkLst>
+      <pc:sldChg chg="modSp mod">
+        <pc:chgData name="남 상현" userId="03ad4a8e8f7310f3" providerId="LiveId" clId="{FF1AED5E-B4D7-4EF1-A2DB-B2AADAA1F743}" dt="2022-04-05T09:20:03.059" v="6" actId="1076"/>
+        <pc:sldMkLst>
+          <pc:docMk/>
+          <pc:sldMk cId="2498653041" sldId="261"/>
+        </pc:sldMkLst>
+        <pc:spChg chg="mod">
+          <ac:chgData name="남 상현" userId="03ad4a8e8f7310f3" providerId="LiveId" clId="{FF1AED5E-B4D7-4EF1-A2DB-B2AADAA1F743}" dt="2022-04-05T09:20:03.059" v="6" actId="1076"/>
+          <ac:spMkLst>
+            <pc:docMk/>
+            <pc:sldMk cId="2498653041" sldId="261"/>
+            <ac:spMk id="291" creationId="{00000000-0000-0000-0000-000000000000}"/>
+          </ac:spMkLst>
+        </pc:spChg>
+        <pc:grpChg chg="mod">
+          <ac:chgData name="남 상현" userId="03ad4a8e8f7310f3" providerId="LiveId" clId="{FF1AED5E-B4D7-4EF1-A2DB-B2AADAA1F743}" dt="2022-04-05T09:19:59.868" v="0" actId="1076"/>
+          <ac:grpSpMkLst>
+            <pc:docMk/>
+            <pc:sldMk cId="2498653041" sldId="261"/>
+            <ac:grpSpMk id="15" creationId="{00000000-0000-0000-0000-000000000000}"/>
+          </ac:grpSpMkLst>
+        </pc:grpChg>
+      </pc:sldChg>
+    </pc:docChg>
+  </pc:docChgLst>
+</pc:chgInfo>
 </file>
 
 <file path=ppt/notesMasters/notesMaster1.xml><?xml version="1.0" encoding="utf-8"?>
@@ -261,38 +322,37 @@
           <a:p>
             <a:pPr lvl="0"/>
             <a:r>
-              <a:rPr lang="ko-KR" altLang="en-US" smtClean="0"/>
+              <a:rPr lang="ko-KR" altLang="en-US"/>
               <a:t>마스터 텍스트 스타일을 편집합니다</a:t>
             </a:r>
           </a:p>
           <a:p>
             <a:pPr lvl="1"/>
             <a:r>
-              <a:rPr lang="ko-KR" altLang="en-US" smtClean="0"/>
+              <a:rPr lang="ko-KR" altLang="en-US"/>
               <a:t>둘째 수준</a:t>
             </a:r>
           </a:p>
           <a:p>
             <a:pPr lvl="2"/>
             <a:r>
-              <a:rPr lang="ko-KR" altLang="en-US" smtClean="0"/>
+              <a:rPr lang="ko-KR" altLang="en-US"/>
               <a:t>셋째 수준</a:t>
             </a:r>
           </a:p>
           <a:p>
             <a:pPr lvl="3"/>
             <a:r>
-              <a:rPr lang="ko-KR" altLang="en-US" smtClean="0"/>
+              <a:rPr lang="ko-KR" altLang="en-US"/>
               <a:t>넷째 수준</a:t>
             </a:r>
           </a:p>
           <a:p>
             <a:pPr lvl="4"/>
             <a:r>
-              <a:rPr lang="ko-KR" altLang="en-US" smtClean="0"/>
+              <a:rPr lang="ko-KR" altLang="en-US"/>
               <a:t>다섯째 수준</a:t>
             </a:r>
-            <a:endParaRPr lang="ko-KR" altLang="en-US"/>
           </a:p>
         </p:txBody>
       </p:sp>
@@ -823,7 +883,7 @@
           <p:cNvPr id="2" name="제목 1">
             <a:extLst>
               <a:ext uri="{FF2B5EF4-FFF2-40B4-BE49-F238E27FC236}">
-                <a16:creationId xmlns="" xmlns:a16="http://schemas.microsoft.com/office/drawing/2014/main" id="{FD3DA7BF-F059-4C7B-BB74-C9CE53F3DD58}"/>
+                <a16:creationId xmlns:a16="http://schemas.microsoft.com/office/drawing/2014/main" id="{FD3DA7BF-F059-4C7B-BB74-C9CE53F3DD58}"/>
               </a:ext>
             </a:extLst>
           </p:cNvPr>
@@ -860,7 +920,7 @@
           <p:cNvPr id="3" name="부제목 2">
             <a:extLst>
               <a:ext uri="{FF2B5EF4-FFF2-40B4-BE49-F238E27FC236}">
-                <a16:creationId xmlns="" xmlns:a16="http://schemas.microsoft.com/office/drawing/2014/main" id="{0113768F-B505-49F2-8A97-B4F8138B6FED}"/>
+                <a16:creationId xmlns:a16="http://schemas.microsoft.com/office/drawing/2014/main" id="{0113768F-B505-49F2-8A97-B4F8138B6FED}"/>
               </a:ext>
             </a:extLst>
           </p:cNvPr>
@@ -930,7 +990,7 @@
           <p:cNvPr id="4" name="날짜 개체 틀 3">
             <a:extLst>
               <a:ext uri="{FF2B5EF4-FFF2-40B4-BE49-F238E27FC236}">
-                <a16:creationId xmlns="" xmlns:a16="http://schemas.microsoft.com/office/drawing/2014/main" id="{86B66418-F8DE-4F24-B5EB-B947923527AD}"/>
+                <a16:creationId xmlns:a16="http://schemas.microsoft.com/office/drawing/2014/main" id="{86B66418-F8DE-4F24-B5EB-B947923527AD}"/>
               </a:ext>
             </a:extLst>
           </p:cNvPr>
@@ -972,7 +1032,7 @@
           <p:cNvPr id="5" name="바닥글 개체 틀 4">
             <a:extLst>
               <a:ext uri="{FF2B5EF4-FFF2-40B4-BE49-F238E27FC236}">
-                <a16:creationId xmlns="" xmlns:a16="http://schemas.microsoft.com/office/drawing/2014/main" id="{959C94BE-D814-45E4-B84D-CC5C5870FD7B}"/>
+                <a16:creationId xmlns:a16="http://schemas.microsoft.com/office/drawing/2014/main" id="{959C94BE-D814-45E4-B84D-CC5C5870FD7B}"/>
               </a:ext>
             </a:extLst>
           </p:cNvPr>
@@ -1003,7 +1063,7 @@
           <p:cNvPr id="6" name="슬라이드 번호 개체 틀 5">
             <a:extLst>
               <a:ext uri="{FF2B5EF4-FFF2-40B4-BE49-F238E27FC236}">
-                <a16:creationId xmlns="" xmlns:a16="http://schemas.microsoft.com/office/drawing/2014/main" id="{611AFA41-A1D8-4F6F-89D4-9092A75CD23D}"/>
+                <a16:creationId xmlns:a16="http://schemas.microsoft.com/office/drawing/2014/main" id="{611AFA41-A1D8-4F6F-89D4-9092A75CD23D}"/>
               </a:ext>
             </a:extLst>
           </p:cNvPr>
@@ -1075,7 +1135,7 @@
           <p:cNvPr id="2" name="제목 1">
             <a:extLst>
               <a:ext uri="{FF2B5EF4-FFF2-40B4-BE49-F238E27FC236}">
-                <a16:creationId xmlns="" xmlns:a16="http://schemas.microsoft.com/office/drawing/2014/main" id="{49A46B1A-EA92-4C98-9741-73B02C657335}"/>
+                <a16:creationId xmlns:a16="http://schemas.microsoft.com/office/drawing/2014/main" id="{49A46B1A-EA92-4C98-9741-73B02C657335}"/>
               </a:ext>
             </a:extLst>
           </p:cNvPr>
@@ -1103,7 +1163,7 @@
           <p:cNvPr id="3" name="세로 텍스트 개체 틀 2">
             <a:extLst>
               <a:ext uri="{FF2B5EF4-FFF2-40B4-BE49-F238E27FC236}">
-                <a16:creationId xmlns="" xmlns:a16="http://schemas.microsoft.com/office/drawing/2014/main" id="{31EA374A-5468-47D5-B6E8-6E028679F0FB}"/>
+                <a16:creationId xmlns:a16="http://schemas.microsoft.com/office/drawing/2014/main" id="{31EA374A-5468-47D5-B6E8-6E028679F0FB}"/>
               </a:ext>
             </a:extLst>
           </p:cNvPr>
@@ -1160,7 +1220,7 @@
           <p:cNvPr id="4" name="날짜 개체 틀 3">
             <a:extLst>
               <a:ext uri="{FF2B5EF4-FFF2-40B4-BE49-F238E27FC236}">
-                <a16:creationId xmlns="" xmlns:a16="http://schemas.microsoft.com/office/drawing/2014/main" id="{8CD0FE6B-CAC0-434B-BB3F-F05938EECA84}"/>
+                <a16:creationId xmlns:a16="http://schemas.microsoft.com/office/drawing/2014/main" id="{8CD0FE6B-CAC0-434B-BB3F-F05938EECA84}"/>
               </a:ext>
             </a:extLst>
           </p:cNvPr>
@@ -1202,7 +1262,7 @@
           <p:cNvPr id="5" name="바닥글 개체 틀 4">
             <a:extLst>
               <a:ext uri="{FF2B5EF4-FFF2-40B4-BE49-F238E27FC236}">
-                <a16:creationId xmlns="" xmlns:a16="http://schemas.microsoft.com/office/drawing/2014/main" id="{BA021E5F-56D8-4BA0-B21C-CCC93BA53159}"/>
+                <a16:creationId xmlns:a16="http://schemas.microsoft.com/office/drawing/2014/main" id="{BA021E5F-56D8-4BA0-B21C-CCC93BA53159}"/>
               </a:ext>
             </a:extLst>
           </p:cNvPr>
@@ -1233,7 +1293,7 @@
           <p:cNvPr id="6" name="슬라이드 번호 개체 틀 5">
             <a:extLst>
               <a:ext uri="{FF2B5EF4-FFF2-40B4-BE49-F238E27FC236}">
-                <a16:creationId xmlns="" xmlns:a16="http://schemas.microsoft.com/office/drawing/2014/main" id="{48C01A8E-F30B-418B-B0A1-2020DD799CEE}"/>
+                <a16:creationId xmlns:a16="http://schemas.microsoft.com/office/drawing/2014/main" id="{48C01A8E-F30B-418B-B0A1-2020DD799CEE}"/>
               </a:ext>
             </a:extLst>
           </p:cNvPr>
@@ -1305,7 +1365,7 @@
           <p:cNvPr id="2" name="세로 제목 1">
             <a:extLst>
               <a:ext uri="{FF2B5EF4-FFF2-40B4-BE49-F238E27FC236}">
-                <a16:creationId xmlns="" xmlns:a16="http://schemas.microsoft.com/office/drawing/2014/main" id="{5DE6916D-CF8B-455B-9351-89632349EDFB}"/>
+                <a16:creationId xmlns:a16="http://schemas.microsoft.com/office/drawing/2014/main" id="{5DE6916D-CF8B-455B-9351-89632349EDFB}"/>
               </a:ext>
             </a:extLst>
           </p:cNvPr>
@@ -1338,7 +1398,7 @@
           <p:cNvPr id="3" name="세로 텍스트 개체 틀 2">
             <a:extLst>
               <a:ext uri="{FF2B5EF4-FFF2-40B4-BE49-F238E27FC236}">
-                <a16:creationId xmlns="" xmlns:a16="http://schemas.microsoft.com/office/drawing/2014/main" id="{BC302AA0-B8BA-4707-AA63-2E9FCEBB7116}"/>
+                <a16:creationId xmlns:a16="http://schemas.microsoft.com/office/drawing/2014/main" id="{BC302AA0-B8BA-4707-AA63-2E9FCEBB7116}"/>
               </a:ext>
             </a:extLst>
           </p:cNvPr>
@@ -1400,7 +1460,7 @@
           <p:cNvPr id="4" name="날짜 개체 틀 3">
             <a:extLst>
               <a:ext uri="{FF2B5EF4-FFF2-40B4-BE49-F238E27FC236}">
-                <a16:creationId xmlns="" xmlns:a16="http://schemas.microsoft.com/office/drawing/2014/main" id="{4A4C103F-6312-4F49-9E2F-ECF4D1CCAAC0}"/>
+                <a16:creationId xmlns:a16="http://schemas.microsoft.com/office/drawing/2014/main" id="{4A4C103F-6312-4F49-9E2F-ECF4D1CCAAC0}"/>
               </a:ext>
             </a:extLst>
           </p:cNvPr>
@@ -1442,7 +1502,7 @@
           <p:cNvPr id="5" name="바닥글 개체 틀 4">
             <a:extLst>
               <a:ext uri="{FF2B5EF4-FFF2-40B4-BE49-F238E27FC236}">
-                <a16:creationId xmlns="" xmlns:a16="http://schemas.microsoft.com/office/drawing/2014/main" id="{B7D52CEE-DBF1-4856-89BB-5347AF47CCF1}"/>
+                <a16:creationId xmlns:a16="http://schemas.microsoft.com/office/drawing/2014/main" id="{B7D52CEE-DBF1-4856-89BB-5347AF47CCF1}"/>
               </a:ext>
             </a:extLst>
           </p:cNvPr>
@@ -1473,7 +1533,7 @@
           <p:cNvPr id="6" name="슬라이드 번호 개체 틀 5">
             <a:extLst>
               <a:ext uri="{FF2B5EF4-FFF2-40B4-BE49-F238E27FC236}">
-                <a16:creationId xmlns="" xmlns:a16="http://schemas.microsoft.com/office/drawing/2014/main" id="{67A5AFE3-3CE0-42C3-8AF3-62B3EA567312}"/>
+                <a16:creationId xmlns:a16="http://schemas.microsoft.com/office/drawing/2014/main" id="{67A5AFE3-3CE0-42C3-8AF3-62B3EA567312}"/>
               </a:ext>
             </a:extLst>
           </p:cNvPr>
@@ -1545,7 +1605,7 @@
           <p:cNvPr id="2" name="제목 1">
             <a:extLst>
               <a:ext uri="{FF2B5EF4-FFF2-40B4-BE49-F238E27FC236}">
-                <a16:creationId xmlns="" xmlns:a16="http://schemas.microsoft.com/office/drawing/2014/main" id="{491AB42B-3AED-49AB-B6C7-4660DC7F3D01}"/>
+                <a16:creationId xmlns:a16="http://schemas.microsoft.com/office/drawing/2014/main" id="{491AB42B-3AED-49AB-B6C7-4660DC7F3D01}"/>
               </a:ext>
             </a:extLst>
           </p:cNvPr>
@@ -1573,7 +1633,7 @@
           <p:cNvPr id="3" name="내용 개체 틀 2">
             <a:extLst>
               <a:ext uri="{FF2B5EF4-FFF2-40B4-BE49-F238E27FC236}">
-                <a16:creationId xmlns="" xmlns:a16="http://schemas.microsoft.com/office/drawing/2014/main" id="{3869C9CE-8010-48F5-B014-1E53939A4C41}"/>
+                <a16:creationId xmlns:a16="http://schemas.microsoft.com/office/drawing/2014/main" id="{3869C9CE-8010-48F5-B014-1E53939A4C41}"/>
               </a:ext>
             </a:extLst>
           </p:cNvPr>
@@ -1630,7 +1690,7 @@
           <p:cNvPr id="4" name="날짜 개체 틀 3">
             <a:extLst>
               <a:ext uri="{FF2B5EF4-FFF2-40B4-BE49-F238E27FC236}">
-                <a16:creationId xmlns="" xmlns:a16="http://schemas.microsoft.com/office/drawing/2014/main" id="{52B7D4B0-477B-4E32-B4B7-0D029C944391}"/>
+                <a16:creationId xmlns:a16="http://schemas.microsoft.com/office/drawing/2014/main" id="{52B7D4B0-477B-4E32-B4B7-0D029C944391}"/>
               </a:ext>
             </a:extLst>
           </p:cNvPr>
@@ -1672,7 +1732,7 @@
           <p:cNvPr id="5" name="바닥글 개체 틀 4">
             <a:extLst>
               <a:ext uri="{FF2B5EF4-FFF2-40B4-BE49-F238E27FC236}">
-                <a16:creationId xmlns="" xmlns:a16="http://schemas.microsoft.com/office/drawing/2014/main" id="{E9A8271A-7557-438A-94A1-C004B4A660A4}"/>
+                <a16:creationId xmlns:a16="http://schemas.microsoft.com/office/drawing/2014/main" id="{E9A8271A-7557-438A-94A1-C004B4A660A4}"/>
               </a:ext>
             </a:extLst>
           </p:cNvPr>
@@ -1703,7 +1763,7 @@
           <p:cNvPr id="6" name="슬라이드 번호 개체 틀 5">
             <a:extLst>
               <a:ext uri="{FF2B5EF4-FFF2-40B4-BE49-F238E27FC236}">
-                <a16:creationId xmlns="" xmlns:a16="http://schemas.microsoft.com/office/drawing/2014/main" id="{94790DD4-0986-40F4-8AE1-63FA09CB2EC4}"/>
+                <a16:creationId xmlns:a16="http://schemas.microsoft.com/office/drawing/2014/main" id="{94790DD4-0986-40F4-8AE1-63FA09CB2EC4}"/>
               </a:ext>
             </a:extLst>
           </p:cNvPr>
@@ -1775,7 +1835,7 @@
           <p:cNvPr id="2" name="제목 1">
             <a:extLst>
               <a:ext uri="{FF2B5EF4-FFF2-40B4-BE49-F238E27FC236}">
-                <a16:creationId xmlns="" xmlns:a16="http://schemas.microsoft.com/office/drawing/2014/main" id="{8D1E8996-0EDD-4036-B54E-CDBF6F5B2752}"/>
+                <a16:creationId xmlns:a16="http://schemas.microsoft.com/office/drawing/2014/main" id="{8D1E8996-0EDD-4036-B54E-CDBF6F5B2752}"/>
               </a:ext>
             </a:extLst>
           </p:cNvPr>
@@ -1812,7 +1872,7 @@
           <p:cNvPr id="3" name="텍스트 개체 틀 2">
             <a:extLst>
               <a:ext uri="{FF2B5EF4-FFF2-40B4-BE49-F238E27FC236}">
-                <a16:creationId xmlns="" xmlns:a16="http://schemas.microsoft.com/office/drawing/2014/main" id="{147B4DE7-29AC-450B-99E8-403D7357E441}"/>
+                <a16:creationId xmlns:a16="http://schemas.microsoft.com/office/drawing/2014/main" id="{147B4DE7-29AC-450B-99E8-403D7357E441}"/>
               </a:ext>
             </a:extLst>
           </p:cNvPr>
@@ -1937,7 +1997,7 @@
           <p:cNvPr id="4" name="날짜 개체 틀 3">
             <a:extLst>
               <a:ext uri="{FF2B5EF4-FFF2-40B4-BE49-F238E27FC236}">
-                <a16:creationId xmlns="" xmlns:a16="http://schemas.microsoft.com/office/drawing/2014/main" id="{DDC0CFF7-009F-4604-8115-9967B0C670DA}"/>
+                <a16:creationId xmlns:a16="http://schemas.microsoft.com/office/drawing/2014/main" id="{DDC0CFF7-009F-4604-8115-9967B0C670DA}"/>
               </a:ext>
             </a:extLst>
           </p:cNvPr>
@@ -1979,7 +2039,7 @@
           <p:cNvPr id="5" name="바닥글 개체 틀 4">
             <a:extLst>
               <a:ext uri="{FF2B5EF4-FFF2-40B4-BE49-F238E27FC236}">
-                <a16:creationId xmlns="" xmlns:a16="http://schemas.microsoft.com/office/drawing/2014/main" id="{5F56D6C5-06BA-4335-B139-1C58887995BF}"/>
+                <a16:creationId xmlns:a16="http://schemas.microsoft.com/office/drawing/2014/main" id="{5F56D6C5-06BA-4335-B139-1C58887995BF}"/>
               </a:ext>
             </a:extLst>
           </p:cNvPr>
@@ -2010,7 +2070,7 @@
           <p:cNvPr id="6" name="슬라이드 번호 개체 틀 5">
             <a:extLst>
               <a:ext uri="{FF2B5EF4-FFF2-40B4-BE49-F238E27FC236}">
-                <a16:creationId xmlns="" xmlns:a16="http://schemas.microsoft.com/office/drawing/2014/main" id="{2C1AE864-6E20-44B8-990B-63CB59B86213}"/>
+                <a16:creationId xmlns:a16="http://schemas.microsoft.com/office/drawing/2014/main" id="{2C1AE864-6E20-44B8-990B-63CB59B86213}"/>
               </a:ext>
             </a:extLst>
           </p:cNvPr>
@@ -2082,7 +2142,7 @@
           <p:cNvPr id="2" name="제목 1">
             <a:extLst>
               <a:ext uri="{FF2B5EF4-FFF2-40B4-BE49-F238E27FC236}">
-                <a16:creationId xmlns="" xmlns:a16="http://schemas.microsoft.com/office/drawing/2014/main" id="{12D101FC-8FDF-41CD-AE43-2BBDF5A83155}"/>
+                <a16:creationId xmlns:a16="http://schemas.microsoft.com/office/drawing/2014/main" id="{12D101FC-8FDF-41CD-AE43-2BBDF5A83155}"/>
               </a:ext>
             </a:extLst>
           </p:cNvPr>
@@ -2110,7 +2170,7 @@
           <p:cNvPr id="3" name="내용 개체 틀 2">
             <a:extLst>
               <a:ext uri="{FF2B5EF4-FFF2-40B4-BE49-F238E27FC236}">
-                <a16:creationId xmlns="" xmlns:a16="http://schemas.microsoft.com/office/drawing/2014/main" id="{D5A5AC06-FA89-4A86-A363-895E42C1C171}"/>
+                <a16:creationId xmlns:a16="http://schemas.microsoft.com/office/drawing/2014/main" id="{D5A5AC06-FA89-4A86-A363-895E42C1C171}"/>
               </a:ext>
             </a:extLst>
           </p:cNvPr>
@@ -2172,7 +2232,7 @@
           <p:cNvPr id="4" name="내용 개체 틀 3">
             <a:extLst>
               <a:ext uri="{FF2B5EF4-FFF2-40B4-BE49-F238E27FC236}">
-                <a16:creationId xmlns="" xmlns:a16="http://schemas.microsoft.com/office/drawing/2014/main" id="{8D0326D2-8AEA-4626-B86B-506C1C6B4D04}"/>
+                <a16:creationId xmlns:a16="http://schemas.microsoft.com/office/drawing/2014/main" id="{8D0326D2-8AEA-4626-B86B-506C1C6B4D04}"/>
               </a:ext>
             </a:extLst>
           </p:cNvPr>
@@ -2234,7 +2294,7 @@
           <p:cNvPr id="5" name="날짜 개체 틀 4">
             <a:extLst>
               <a:ext uri="{FF2B5EF4-FFF2-40B4-BE49-F238E27FC236}">
-                <a16:creationId xmlns="" xmlns:a16="http://schemas.microsoft.com/office/drawing/2014/main" id="{3653A59D-CF38-49BF-ABCE-593455734357}"/>
+                <a16:creationId xmlns:a16="http://schemas.microsoft.com/office/drawing/2014/main" id="{3653A59D-CF38-49BF-ABCE-593455734357}"/>
               </a:ext>
             </a:extLst>
           </p:cNvPr>
@@ -2276,7 +2336,7 @@
           <p:cNvPr id="6" name="바닥글 개체 틀 5">
             <a:extLst>
               <a:ext uri="{FF2B5EF4-FFF2-40B4-BE49-F238E27FC236}">
-                <a16:creationId xmlns="" xmlns:a16="http://schemas.microsoft.com/office/drawing/2014/main" id="{3E795CB1-41A0-4C7D-9487-7D256413BB2E}"/>
+                <a16:creationId xmlns:a16="http://schemas.microsoft.com/office/drawing/2014/main" id="{3E795CB1-41A0-4C7D-9487-7D256413BB2E}"/>
               </a:ext>
             </a:extLst>
           </p:cNvPr>
@@ -2307,7 +2367,7 @@
           <p:cNvPr id="7" name="슬라이드 번호 개체 틀 6">
             <a:extLst>
               <a:ext uri="{FF2B5EF4-FFF2-40B4-BE49-F238E27FC236}">
-                <a16:creationId xmlns="" xmlns:a16="http://schemas.microsoft.com/office/drawing/2014/main" id="{8FA49215-F9D5-4946-9136-BD5C41EDFCB5}"/>
+                <a16:creationId xmlns:a16="http://schemas.microsoft.com/office/drawing/2014/main" id="{8FA49215-F9D5-4946-9136-BD5C41EDFCB5}"/>
               </a:ext>
             </a:extLst>
           </p:cNvPr>
@@ -2379,7 +2439,7 @@
           <p:cNvPr id="2" name="제목 1">
             <a:extLst>
               <a:ext uri="{FF2B5EF4-FFF2-40B4-BE49-F238E27FC236}">
-                <a16:creationId xmlns="" xmlns:a16="http://schemas.microsoft.com/office/drawing/2014/main" id="{5E866056-C69F-4F34-AF93-FAFC48756A28}"/>
+                <a16:creationId xmlns:a16="http://schemas.microsoft.com/office/drawing/2014/main" id="{5E866056-C69F-4F34-AF93-FAFC48756A28}"/>
               </a:ext>
             </a:extLst>
           </p:cNvPr>
@@ -2412,7 +2472,7 @@
           <p:cNvPr id="3" name="텍스트 개체 틀 2">
             <a:extLst>
               <a:ext uri="{FF2B5EF4-FFF2-40B4-BE49-F238E27FC236}">
-                <a16:creationId xmlns="" xmlns:a16="http://schemas.microsoft.com/office/drawing/2014/main" id="{2DCC9BB8-5102-465A-AA1B-DA87820FA1F3}"/>
+                <a16:creationId xmlns:a16="http://schemas.microsoft.com/office/drawing/2014/main" id="{2DCC9BB8-5102-465A-AA1B-DA87820FA1F3}"/>
               </a:ext>
             </a:extLst>
           </p:cNvPr>
@@ -2483,7 +2543,7 @@
           <p:cNvPr id="4" name="내용 개체 틀 3">
             <a:extLst>
               <a:ext uri="{FF2B5EF4-FFF2-40B4-BE49-F238E27FC236}">
-                <a16:creationId xmlns="" xmlns:a16="http://schemas.microsoft.com/office/drawing/2014/main" id="{3BCCF302-1422-4ADD-BCE5-13DC41655702}"/>
+                <a16:creationId xmlns:a16="http://schemas.microsoft.com/office/drawing/2014/main" id="{3BCCF302-1422-4ADD-BCE5-13DC41655702}"/>
               </a:ext>
             </a:extLst>
           </p:cNvPr>
@@ -2545,7 +2605,7 @@
           <p:cNvPr id="5" name="텍스트 개체 틀 4">
             <a:extLst>
               <a:ext uri="{FF2B5EF4-FFF2-40B4-BE49-F238E27FC236}">
-                <a16:creationId xmlns="" xmlns:a16="http://schemas.microsoft.com/office/drawing/2014/main" id="{AAFE70BD-DD4B-4D8C-AE8C-CEFBABCC805F}"/>
+                <a16:creationId xmlns:a16="http://schemas.microsoft.com/office/drawing/2014/main" id="{AAFE70BD-DD4B-4D8C-AE8C-CEFBABCC805F}"/>
               </a:ext>
             </a:extLst>
           </p:cNvPr>
@@ -2616,7 +2676,7 @@
           <p:cNvPr id="6" name="내용 개체 틀 5">
             <a:extLst>
               <a:ext uri="{FF2B5EF4-FFF2-40B4-BE49-F238E27FC236}">
-                <a16:creationId xmlns="" xmlns:a16="http://schemas.microsoft.com/office/drawing/2014/main" id="{4670F0D1-6CFF-4C84-AC06-F7FA2E70EA54}"/>
+                <a16:creationId xmlns:a16="http://schemas.microsoft.com/office/drawing/2014/main" id="{4670F0D1-6CFF-4C84-AC06-F7FA2E70EA54}"/>
               </a:ext>
             </a:extLst>
           </p:cNvPr>
@@ -2678,7 +2738,7 @@
           <p:cNvPr id="7" name="날짜 개체 틀 6">
             <a:extLst>
               <a:ext uri="{FF2B5EF4-FFF2-40B4-BE49-F238E27FC236}">
-                <a16:creationId xmlns="" xmlns:a16="http://schemas.microsoft.com/office/drawing/2014/main" id="{F3909CF5-7AAF-4F93-95F0-99872893D053}"/>
+                <a16:creationId xmlns:a16="http://schemas.microsoft.com/office/drawing/2014/main" id="{F3909CF5-7AAF-4F93-95F0-99872893D053}"/>
               </a:ext>
             </a:extLst>
           </p:cNvPr>
@@ -2720,7 +2780,7 @@
           <p:cNvPr id="8" name="바닥글 개체 틀 7">
             <a:extLst>
               <a:ext uri="{FF2B5EF4-FFF2-40B4-BE49-F238E27FC236}">
-                <a16:creationId xmlns="" xmlns:a16="http://schemas.microsoft.com/office/drawing/2014/main" id="{808D2E3F-FF0B-4E29-BE69-5AC6FB135047}"/>
+                <a16:creationId xmlns:a16="http://schemas.microsoft.com/office/drawing/2014/main" id="{808D2E3F-FF0B-4E29-BE69-5AC6FB135047}"/>
               </a:ext>
             </a:extLst>
           </p:cNvPr>
@@ -2751,7 +2811,7 @@
           <p:cNvPr id="9" name="슬라이드 번호 개체 틀 8">
             <a:extLst>
               <a:ext uri="{FF2B5EF4-FFF2-40B4-BE49-F238E27FC236}">
-                <a16:creationId xmlns="" xmlns:a16="http://schemas.microsoft.com/office/drawing/2014/main" id="{BE5C1BB3-B928-4B72-A9E9-06960FE1E4A3}"/>
+                <a16:creationId xmlns:a16="http://schemas.microsoft.com/office/drawing/2014/main" id="{BE5C1BB3-B928-4B72-A9E9-06960FE1E4A3}"/>
               </a:ext>
             </a:extLst>
           </p:cNvPr>
@@ -2823,7 +2883,7 @@
           <p:cNvPr id="2" name="제목 1">
             <a:extLst>
               <a:ext uri="{FF2B5EF4-FFF2-40B4-BE49-F238E27FC236}">
-                <a16:creationId xmlns="" xmlns:a16="http://schemas.microsoft.com/office/drawing/2014/main" id="{60372EE6-92DB-4B53-B296-7BBA54281990}"/>
+                <a16:creationId xmlns:a16="http://schemas.microsoft.com/office/drawing/2014/main" id="{60372EE6-92DB-4B53-B296-7BBA54281990}"/>
               </a:ext>
             </a:extLst>
           </p:cNvPr>
@@ -2851,7 +2911,7 @@
           <p:cNvPr id="3" name="날짜 개체 틀 2">
             <a:extLst>
               <a:ext uri="{FF2B5EF4-FFF2-40B4-BE49-F238E27FC236}">
-                <a16:creationId xmlns="" xmlns:a16="http://schemas.microsoft.com/office/drawing/2014/main" id="{AC68BC93-BD18-419E-ABEA-CE2190C3A357}"/>
+                <a16:creationId xmlns:a16="http://schemas.microsoft.com/office/drawing/2014/main" id="{AC68BC93-BD18-419E-ABEA-CE2190C3A357}"/>
               </a:ext>
             </a:extLst>
           </p:cNvPr>
@@ -2893,7 +2953,7 @@
           <p:cNvPr id="4" name="바닥글 개체 틀 3">
             <a:extLst>
               <a:ext uri="{FF2B5EF4-FFF2-40B4-BE49-F238E27FC236}">
-                <a16:creationId xmlns="" xmlns:a16="http://schemas.microsoft.com/office/drawing/2014/main" id="{5A57DEE3-979A-4E80-BFFA-D8DD9664F0F6}"/>
+                <a16:creationId xmlns:a16="http://schemas.microsoft.com/office/drawing/2014/main" id="{5A57DEE3-979A-4E80-BFFA-D8DD9664F0F6}"/>
               </a:ext>
             </a:extLst>
           </p:cNvPr>
@@ -2924,7 +2984,7 @@
           <p:cNvPr id="5" name="슬라이드 번호 개체 틀 4">
             <a:extLst>
               <a:ext uri="{FF2B5EF4-FFF2-40B4-BE49-F238E27FC236}">
-                <a16:creationId xmlns="" xmlns:a16="http://schemas.microsoft.com/office/drawing/2014/main" id="{E6B799FB-63C5-4AE9-A85A-B75BF8DF8EDE}"/>
+                <a16:creationId xmlns:a16="http://schemas.microsoft.com/office/drawing/2014/main" id="{E6B799FB-63C5-4AE9-A85A-B75BF8DF8EDE}"/>
               </a:ext>
             </a:extLst>
           </p:cNvPr>
@@ -2996,7 +3056,7 @@
           <p:cNvPr id="2" name="날짜 개체 틀 1">
             <a:extLst>
               <a:ext uri="{FF2B5EF4-FFF2-40B4-BE49-F238E27FC236}">
-                <a16:creationId xmlns="" xmlns:a16="http://schemas.microsoft.com/office/drawing/2014/main" id="{1B02EEBA-1AB0-4697-B15F-0D2C7A1197C8}"/>
+                <a16:creationId xmlns:a16="http://schemas.microsoft.com/office/drawing/2014/main" id="{1B02EEBA-1AB0-4697-B15F-0D2C7A1197C8}"/>
               </a:ext>
             </a:extLst>
           </p:cNvPr>
@@ -3038,7 +3098,7 @@
           <p:cNvPr id="3" name="바닥글 개체 틀 2">
             <a:extLst>
               <a:ext uri="{FF2B5EF4-FFF2-40B4-BE49-F238E27FC236}">
-                <a16:creationId xmlns="" xmlns:a16="http://schemas.microsoft.com/office/drawing/2014/main" id="{49BE996B-4D79-4142-83AF-715974F98FCC}"/>
+                <a16:creationId xmlns:a16="http://schemas.microsoft.com/office/drawing/2014/main" id="{49BE996B-4D79-4142-83AF-715974F98FCC}"/>
               </a:ext>
             </a:extLst>
           </p:cNvPr>
@@ -3069,7 +3129,7 @@
           <p:cNvPr id="4" name="슬라이드 번호 개체 틀 3">
             <a:extLst>
               <a:ext uri="{FF2B5EF4-FFF2-40B4-BE49-F238E27FC236}">
-                <a16:creationId xmlns="" xmlns:a16="http://schemas.microsoft.com/office/drawing/2014/main" id="{C97F5C44-D18A-4042-9DA7-DCBF4571A9AF}"/>
+                <a16:creationId xmlns:a16="http://schemas.microsoft.com/office/drawing/2014/main" id="{C97F5C44-D18A-4042-9DA7-DCBF4571A9AF}"/>
               </a:ext>
             </a:extLst>
           </p:cNvPr>
@@ -3141,7 +3201,7 @@
           <p:cNvPr id="2" name="제목 1">
             <a:extLst>
               <a:ext uri="{FF2B5EF4-FFF2-40B4-BE49-F238E27FC236}">
-                <a16:creationId xmlns="" xmlns:a16="http://schemas.microsoft.com/office/drawing/2014/main" id="{011B2472-823F-407C-A639-26D899A04E2B}"/>
+                <a16:creationId xmlns:a16="http://schemas.microsoft.com/office/drawing/2014/main" id="{011B2472-823F-407C-A639-26D899A04E2B}"/>
               </a:ext>
             </a:extLst>
           </p:cNvPr>
@@ -3178,7 +3238,7 @@
           <p:cNvPr id="3" name="내용 개체 틀 2">
             <a:extLst>
               <a:ext uri="{FF2B5EF4-FFF2-40B4-BE49-F238E27FC236}">
-                <a16:creationId xmlns="" xmlns:a16="http://schemas.microsoft.com/office/drawing/2014/main" id="{6979E11D-8E51-4870-A405-80244216BB8D}"/>
+                <a16:creationId xmlns:a16="http://schemas.microsoft.com/office/drawing/2014/main" id="{6979E11D-8E51-4870-A405-80244216BB8D}"/>
               </a:ext>
             </a:extLst>
           </p:cNvPr>
@@ -3268,7 +3328,7 @@
           <p:cNvPr id="4" name="텍스트 개체 틀 3">
             <a:extLst>
               <a:ext uri="{FF2B5EF4-FFF2-40B4-BE49-F238E27FC236}">
-                <a16:creationId xmlns="" xmlns:a16="http://schemas.microsoft.com/office/drawing/2014/main" id="{0A70474C-92AB-48D0-B372-54858ADA7461}"/>
+                <a16:creationId xmlns:a16="http://schemas.microsoft.com/office/drawing/2014/main" id="{0A70474C-92AB-48D0-B372-54858ADA7461}"/>
               </a:ext>
             </a:extLst>
           </p:cNvPr>
@@ -3339,7 +3399,7 @@
           <p:cNvPr id="5" name="날짜 개체 틀 4">
             <a:extLst>
               <a:ext uri="{FF2B5EF4-FFF2-40B4-BE49-F238E27FC236}">
-                <a16:creationId xmlns="" xmlns:a16="http://schemas.microsoft.com/office/drawing/2014/main" id="{36E889E4-32C7-43B6-BCCF-444A68AA4C0F}"/>
+                <a16:creationId xmlns:a16="http://schemas.microsoft.com/office/drawing/2014/main" id="{36E889E4-32C7-43B6-BCCF-444A68AA4C0F}"/>
               </a:ext>
             </a:extLst>
           </p:cNvPr>
@@ -3381,7 +3441,7 @@
           <p:cNvPr id="6" name="바닥글 개체 틀 5">
             <a:extLst>
               <a:ext uri="{FF2B5EF4-FFF2-40B4-BE49-F238E27FC236}">
-                <a16:creationId xmlns="" xmlns:a16="http://schemas.microsoft.com/office/drawing/2014/main" id="{3BC2EFB7-E04A-466D-A284-5881AECF277D}"/>
+                <a16:creationId xmlns:a16="http://schemas.microsoft.com/office/drawing/2014/main" id="{3BC2EFB7-E04A-466D-A284-5881AECF277D}"/>
               </a:ext>
             </a:extLst>
           </p:cNvPr>
@@ -3412,7 +3472,7 @@
           <p:cNvPr id="7" name="슬라이드 번호 개체 틀 6">
             <a:extLst>
               <a:ext uri="{FF2B5EF4-FFF2-40B4-BE49-F238E27FC236}">
-                <a16:creationId xmlns="" xmlns:a16="http://schemas.microsoft.com/office/drawing/2014/main" id="{B8FBC2D8-64FA-47FF-A9B8-E28B5C1F1B7E}"/>
+                <a16:creationId xmlns:a16="http://schemas.microsoft.com/office/drawing/2014/main" id="{B8FBC2D8-64FA-47FF-A9B8-E28B5C1F1B7E}"/>
               </a:ext>
             </a:extLst>
           </p:cNvPr>
@@ -3484,7 +3544,7 @@
           <p:cNvPr id="2" name="제목 1">
             <a:extLst>
               <a:ext uri="{FF2B5EF4-FFF2-40B4-BE49-F238E27FC236}">
-                <a16:creationId xmlns="" xmlns:a16="http://schemas.microsoft.com/office/drawing/2014/main" id="{A093D711-A548-4962-AC9E-9E3BE89B9866}"/>
+                <a16:creationId xmlns:a16="http://schemas.microsoft.com/office/drawing/2014/main" id="{A093D711-A548-4962-AC9E-9E3BE89B9866}"/>
               </a:ext>
             </a:extLst>
           </p:cNvPr>
@@ -3521,7 +3581,7 @@
           <p:cNvPr id="3" name="그림 개체 틀 2">
             <a:extLst>
               <a:ext uri="{FF2B5EF4-FFF2-40B4-BE49-F238E27FC236}">
-                <a16:creationId xmlns="" xmlns:a16="http://schemas.microsoft.com/office/drawing/2014/main" id="{98E9CAF5-EAD7-40FC-B1D1-D01F8CC221F4}"/>
+                <a16:creationId xmlns:a16="http://schemas.microsoft.com/office/drawing/2014/main" id="{98E9CAF5-EAD7-40FC-B1D1-D01F8CC221F4}"/>
               </a:ext>
             </a:extLst>
           </p:cNvPr>
@@ -3588,7 +3648,7 @@
           <p:cNvPr id="4" name="텍스트 개체 틀 3">
             <a:extLst>
               <a:ext uri="{FF2B5EF4-FFF2-40B4-BE49-F238E27FC236}">
-                <a16:creationId xmlns="" xmlns:a16="http://schemas.microsoft.com/office/drawing/2014/main" id="{F3B75E22-D1AB-489E-A5DC-2C983E5445AF}"/>
+                <a16:creationId xmlns:a16="http://schemas.microsoft.com/office/drawing/2014/main" id="{F3B75E22-D1AB-489E-A5DC-2C983E5445AF}"/>
               </a:ext>
             </a:extLst>
           </p:cNvPr>
@@ -3659,7 +3719,7 @@
           <p:cNvPr id="5" name="날짜 개체 틀 4">
             <a:extLst>
               <a:ext uri="{FF2B5EF4-FFF2-40B4-BE49-F238E27FC236}">
-                <a16:creationId xmlns="" xmlns:a16="http://schemas.microsoft.com/office/drawing/2014/main" id="{9A9562B8-686B-4884-9189-AD6E7E95F41C}"/>
+                <a16:creationId xmlns:a16="http://schemas.microsoft.com/office/drawing/2014/main" id="{9A9562B8-686B-4884-9189-AD6E7E95F41C}"/>
               </a:ext>
             </a:extLst>
           </p:cNvPr>
@@ -3701,7 +3761,7 @@
           <p:cNvPr id="6" name="바닥글 개체 틀 5">
             <a:extLst>
               <a:ext uri="{FF2B5EF4-FFF2-40B4-BE49-F238E27FC236}">
-                <a16:creationId xmlns="" xmlns:a16="http://schemas.microsoft.com/office/drawing/2014/main" id="{5981B8C2-430B-4359-A460-F4284E1AB1AE}"/>
+                <a16:creationId xmlns:a16="http://schemas.microsoft.com/office/drawing/2014/main" id="{5981B8C2-430B-4359-A460-F4284E1AB1AE}"/>
               </a:ext>
             </a:extLst>
           </p:cNvPr>
@@ -3732,7 +3792,7 @@
           <p:cNvPr id="7" name="슬라이드 번호 개체 틀 6">
             <a:extLst>
               <a:ext uri="{FF2B5EF4-FFF2-40B4-BE49-F238E27FC236}">
-                <a16:creationId xmlns="" xmlns:a16="http://schemas.microsoft.com/office/drawing/2014/main" id="{29EF19C2-8C15-4D48-B84B-8CDAC8219A85}"/>
+                <a16:creationId xmlns:a16="http://schemas.microsoft.com/office/drawing/2014/main" id="{29EF19C2-8C15-4D48-B84B-8CDAC8219A85}"/>
               </a:ext>
             </a:extLst>
           </p:cNvPr>
@@ -3809,7 +3869,7 @@
           <p:cNvPr id="2" name="제목 개체 틀 1">
             <a:extLst>
               <a:ext uri="{FF2B5EF4-FFF2-40B4-BE49-F238E27FC236}">
-                <a16:creationId xmlns="" xmlns:a16="http://schemas.microsoft.com/office/drawing/2014/main" id="{1B126F51-47D4-4C15-8D88-F49E2A36E93F}"/>
+                <a16:creationId xmlns:a16="http://schemas.microsoft.com/office/drawing/2014/main" id="{1B126F51-47D4-4C15-8D88-F49E2A36E93F}"/>
               </a:ext>
             </a:extLst>
           </p:cNvPr>
@@ -3847,7 +3907,7 @@
           <p:cNvPr id="3" name="텍스트 개체 틀 2">
             <a:extLst>
               <a:ext uri="{FF2B5EF4-FFF2-40B4-BE49-F238E27FC236}">
-                <a16:creationId xmlns="" xmlns:a16="http://schemas.microsoft.com/office/drawing/2014/main" id="{0035FA75-F154-4E3D-B0FA-99729CEE2E39}"/>
+                <a16:creationId xmlns:a16="http://schemas.microsoft.com/office/drawing/2014/main" id="{0035FA75-F154-4E3D-B0FA-99729CEE2E39}"/>
               </a:ext>
             </a:extLst>
           </p:cNvPr>
@@ -3914,7 +3974,7 @@
           <p:cNvPr id="4" name="날짜 개체 틀 3">
             <a:extLst>
               <a:ext uri="{FF2B5EF4-FFF2-40B4-BE49-F238E27FC236}">
-                <a16:creationId xmlns="" xmlns:a16="http://schemas.microsoft.com/office/drawing/2014/main" id="{B8C41FD0-88DE-426C-9EFE-A648B10DCFED}"/>
+                <a16:creationId xmlns:a16="http://schemas.microsoft.com/office/drawing/2014/main" id="{B8C41FD0-88DE-426C-9EFE-A648B10DCFED}"/>
               </a:ext>
             </a:extLst>
           </p:cNvPr>
@@ -3975,7 +4035,7 @@
           <p:cNvPr id="5" name="바닥글 개체 틀 4">
             <a:extLst>
               <a:ext uri="{FF2B5EF4-FFF2-40B4-BE49-F238E27FC236}">
-                <a16:creationId xmlns="" xmlns:a16="http://schemas.microsoft.com/office/drawing/2014/main" id="{CB0A9C28-A9F3-40FB-9F26-29024159602D}"/>
+                <a16:creationId xmlns:a16="http://schemas.microsoft.com/office/drawing/2014/main" id="{CB0A9C28-A9F3-40FB-9F26-29024159602D}"/>
               </a:ext>
             </a:extLst>
           </p:cNvPr>
@@ -4025,7 +4085,7 @@
           <p:cNvPr id="6" name="슬라이드 번호 개체 틀 5">
             <a:extLst>
               <a:ext uri="{FF2B5EF4-FFF2-40B4-BE49-F238E27FC236}">
-                <a16:creationId xmlns="" xmlns:a16="http://schemas.microsoft.com/office/drawing/2014/main" id="{9E1DECEB-9B00-4A96-A10E-74EDE29DD457}"/>
+                <a16:creationId xmlns:a16="http://schemas.microsoft.com/office/drawing/2014/main" id="{9E1DECEB-9B00-4A96-A10E-74EDE29DD457}"/>
               </a:ext>
             </a:extLst>
           </p:cNvPr>
@@ -4407,7 +4467,7 @@
           <p:cNvPr id="4" name="사각형: 둥근 모서리 1">
             <a:extLst>
               <a:ext uri="{FF2B5EF4-FFF2-40B4-BE49-F238E27FC236}">
-                <a16:creationId xmlns="" xmlns:a16="http://schemas.microsoft.com/office/drawing/2014/main" id="{440AAC75-CCCD-42C5-A719-078A6B06078F}"/>
+                <a16:creationId xmlns:a16="http://schemas.microsoft.com/office/drawing/2014/main" id="{440AAC75-CCCD-42C5-A719-078A6B06078F}"/>
               </a:ext>
             </a:extLst>
           </p:cNvPr>
@@ -4454,11 +4514,7 @@
             <a:pPr algn="ctr"/>
             <a:r>
               <a:rPr lang="en-US" altLang="ko-KR" dirty="0"/>
-              <a:t>Stage </a:t>
-            </a:r>
-            <a:r>
-              <a:rPr lang="en-US" altLang="ko-KR" dirty="0" smtClean="0"/>
-              <a:t>L1</a:t>
+              <a:t>Stage L1</a:t>
             </a:r>
             <a:endParaRPr lang="ko-KR" altLang="en-US" dirty="0"/>
           </a:p>
@@ -4483,7 +4539,7 @@
             <p:cNvPr id="6" name="직선 연결선 5">
               <a:extLst>
                 <a:ext uri="{FF2B5EF4-FFF2-40B4-BE49-F238E27FC236}">
-                  <a16:creationId xmlns="" xmlns:a16="http://schemas.microsoft.com/office/drawing/2014/main" id="{4CB4DB58-32B9-4FE8-87D2-2E8715947E96}"/>
+                  <a16:creationId xmlns:a16="http://schemas.microsoft.com/office/drawing/2014/main" id="{4CB4DB58-32B9-4FE8-87D2-2E8715947E96}"/>
                 </a:ext>
               </a:extLst>
             </p:cNvPr>
@@ -4538,7 +4594,7 @@
               <p:cNvPr id="10" name="그룹 9">
                 <a:extLst>
                   <a:ext uri="{FF2B5EF4-FFF2-40B4-BE49-F238E27FC236}">
-                    <a16:creationId xmlns="" xmlns:a16="http://schemas.microsoft.com/office/drawing/2014/main" id="{76DABCB2-673C-4C20-9D8C-3D34F879882E}"/>
+                    <a16:creationId xmlns:a16="http://schemas.microsoft.com/office/drawing/2014/main" id="{76DABCB2-673C-4C20-9D8C-3D34F879882E}"/>
                   </a:ext>
                 </a:extLst>
               </p:cNvPr>
@@ -4558,7 +4614,7 @@
                 <p:cNvPr id="24" name="직사각형 23">
                   <a:extLst>
                     <a:ext uri="{FF2B5EF4-FFF2-40B4-BE49-F238E27FC236}">
-                      <a16:creationId xmlns="" xmlns:a16="http://schemas.microsoft.com/office/drawing/2014/main" id="{A9ABBA21-5911-4FDC-94D2-91C348241B8C}"/>
+                      <a16:creationId xmlns:a16="http://schemas.microsoft.com/office/drawing/2014/main" id="{A9ABBA21-5911-4FDC-94D2-91C348241B8C}"/>
                     </a:ext>
                   </a:extLst>
                 </p:cNvPr>
@@ -4713,7 +4769,7 @@
                 <p:cNvPr id="25" name="직사각형 24">
                   <a:extLst>
                     <a:ext uri="{FF2B5EF4-FFF2-40B4-BE49-F238E27FC236}">
-                      <a16:creationId xmlns="" xmlns:a16="http://schemas.microsoft.com/office/drawing/2014/main" id="{81A93B56-CCFB-40B5-85A9-0D17501E6DFB}"/>
+                      <a16:creationId xmlns:a16="http://schemas.microsoft.com/office/drawing/2014/main" id="{81A93B56-CCFB-40B5-85A9-0D17501E6DFB}"/>
                     </a:ext>
                   </a:extLst>
                 </p:cNvPr>
@@ -4868,7 +4924,7 @@
                 <p:cNvPr id="26" name="직사각형 25">
                   <a:extLst>
                     <a:ext uri="{FF2B5EF4-FFF2-40B4-BE49-F238E27FC236}">
-                      <a16:creationId xmlns="" xmlns:a16="http://schemas.microsoft.com/office/drawing/2014/main" id="{0A175F1B-F7F0-4DD3-8848-68DE36D7BB32}"/>
+                      <a16:creationId xmlns:a16="http://schemas.microsoft.com/office/drawing/2014/main" id="{0A175F1B-F7F0-4DD3-8848-68DE36D7BB32}"/>
                     </a:ext>
                   </a:extLst>
                 </p:cNvPr>
@@ -5021,7 +5077,7 @@
               <p:cNvPr id="11" name="그룹 10">
                 <a:extLst>
                   <a:ext uri="{FF2B5EF4-FFF2-40B4-BE49-F238E27FC236}">
-                    <a16:creationId xmlns="" xmlns:a16="http://schemas.microsoft.com/office/drawing/2014/main" id="{918917CD-BBE8-4F8A-811B-58EB1750CED4}"/>
+                    <a16:creationId xmlns:a16="http://schemas.microsoft.com/office/drawing/2014/main" id="{918917CD-BBE8-4F8A-811B-58EB1750CED4}"/>
                   </a:ext>
                 </a:extLst>
               </p:cNvPr>
@@ -5041,7 +5097,7 @@
                 <p:cNvPr id="12" name="TextBox 6">
                   <a:extLst>
                     <a:ext uri="{FF2B5EF4-FFF2-40B4-BE49-F238E27FC236}">
-                      <a16:creationId xmlns="" xmlns:a16="http://schemas.microsoft.com/office/drawing/2014/main" id="{5A8BA3B6-06BC-4840-B7C0-10C6F253D1FB}"/>
+                      <a16:creationId xmlns:a16="http://schemas.microsoft.com/office/drawing/2014/main" id="{5A8BA3B6-06BC-4840-B7C0-10C6F253D1FB}"/>
                     </a:ext>
                   </a:extLst>
                 </p:cNvPr>
@@ -5171,7 +5227,7 @@
                 <p:cNvPr id="13" name="TextBox 7">
                   <a:extLst>
                     <a:ext uri="{FF2B5EF4-FFF2-40B4-BE49-F238E27FC236}">
-                      <a16:creationId xmlns="" xmlns:a16="http://schemas.microsoft.com/office/drawing/2014/main" id="{80504186-EF68-473C-9453-961301A14772}"/>
+                      <a16:creationId xmlns:a16="http://schemas.microsoft.com/office/drawing/2014/main" id="{80504186-EF68-473C-9453-961301A14772}"/>
                     </a:ext>
                   </a:extLst>
                 </p:cNvPr>
@@ -5290,11 +5346,7 @@
                 <a:p>
                   <a:r>
                     <a:rPr lang="en-US" altLang="ko-KR" sz="1400" dirty="0"/>
-                    <a:t>8</a:t>
-                  </a:r>
-                  <a:r>
-                    <a:rPr lang="en-US" altLang="ko-KR" sz="1400" dirty="0" smtClean="0"/>
-                    <a:t>m</a:t>
+                    <a:t>8m</a:t>
                   </a:r>
                   <a:endParaRPr lang="ko-KR" altLang="en-US" sz="1400" dirty="0"/>
                 </a:p>
@@ -5305,7 +5357,7 @@
                 <p:cNvPr id="14" name="TextBox 8">
                   <a:extLst>
                     <a:ext uri="{FF2B5EF4-FFF2-40B4-BE49-F238E27FC236}">
-                      <a16:creationId xmlns="" xmlns:a16="http://schemas.microsoft.com/office/drawing/2014/main" id="{88F5D136-8976-4A75-A9B9-1A348286C243}"/>
+                      <a16:creationId xmlns:a16="http://schemas.microsoft.com/office/drawing/2014/main" id="{88F5D136-8976-4A75-A9B9-1A348286C243}"/>
                     </a:ext>
                   </a:extLst>
                 </p:cNvPr>
@@ -5424,11 +5476,7 @@
                 <a:p>
                   <a:r>
                     <a:rPr lang="en-US" altLang="ko-KR" sz="1400" dirty="0"/>
-                    <a:t>9</a:t>
-                  </a:r>
-                  <a:r>
-                    <a:rPr lang="en-US" altLang="ko-KR" sz="1400" dirty="0" smtClean="0"/>
-                    <a:t>m</a:t>
+                    <a:t>9m</a:t>
                   </a:r>
                   <a:endParaRPr lang="ko-KR" altLang="en-US" sz="1400" dirty="0"/>
                 </a:p>
@@ -5439,7 +5487,7 @@
                 <p:cNvPr id="18" name="TextBox 12">
                   <a:extLst>
                     <a:ext uri="{FF2B5EF4-FFF2-40B4-BE49-F238E27FC236}">
-                      <a16:creationId xmlns="" xmlns:a16="http://schemas.microsoft.com/office/drawing/2014/main" id="{FF5CFF28-F925-4379-BC3C-70773494DFD5}"/>
+                      <a16:creationId xmlns:a16="http://schemas.microsoft.com/office/drawing/2014/main" id="{FF5CFF28-F925-4379-BC3C-70773494DFD5}"/>
                     </a:ext>
                   </a:extLst>
                 </p:cNvPr>
@@ -5569,7 +5617,7 @@
                 <p:cNvPr id="19" name="TextBox 13">
                   <a:extLst>
                     <a:ext uri="{FF2B5EF4-FFF2-40B4-BE49-F238E27FC236}">
-                      <a16:creationId xmlns="" xmlns:a16="http://schemas.microsoft.com/office/drawing/2014/main" id="{323E0303-92EA-4E53-9580-4733CDDB3E1B}"/>
+                      <a16:creationId xmlns:a16="http://schemas.microsoft.com/office/drawing/2014/main" id="{323E0303-92EA-4E53-9580-4733CDDB3E1B}"/>
                     </a:ext>
                   </a:extLst>
                 </p:cNvPr>
@@ -5699,7 +5747,7 @@
                 <p:cNvPr id="20" name="TextBox 14">
                   <a:extLst>
                     <a:ext uri="{FF2B5EF4-FFF2-40B4-BE49-F238E27FC236}">
-                      <a16:creationId xmlns="" xmlns:a16="http://schemas.microsoft.com/office/drawing/2014/main" id="{E0B6FBA8-CC08-40F0-94B7-B574354692CA}"/>
+                      <a16:creationId xmlns:a16="http://schemas.microsoft.com/office/drawing/2014/main" id="{E0B6FBA8-CC08-40F0-94B7-B574354692CA}"/>
                     </a:ext>
                   </a:extLst>
                 </p:cNvPr>
@@ -5831,7 +5879,7 @@
             <p:cNvPr id="9" name="TextBox 8">
               <a:extLst>
                 <a:ext uri="{FF2B5EF4-FFF2-40B4-BE49-F238E27FC236}">
-                  <a16:creationId xmlns="" xmlns:a16="http://schemas.microsoft.com/office/drawing/2014/main" id="{44A24A8D-E5C7-4722-B586-FBB53D231F1B}"/>
+                  <a16:creationId xmlns:a16="http://schemas.microsoft.com/office/drawing/2014/main" id="{44A24A8D-E5C7-4722-B586-FBB53D231F1B}"/>
                 </a:ext>
               </a:extLst>
             </p:cNvPr>
@@ -5855,7 +5903,7 @@
             <a:lstStyle/>
             <a:p>
               <a:r>
-                <a:rPr lang="en-US" altLang="ko-KR" dirty="0" smtClean="0"/>
+                <a:rPr lang="en-US" altLang="ko-KR" dirty="0"/>
                 <a:t>10g x 24g x 16g  </a:t>
               </a:r>
               <a:endParaRPr lang="ko-KR" altLang="en-US" dirty="0"/>
@@ -16399,7 +16447,7 @@
             <p:cNvPr id="613" name="그룹 612">
               <a:extLst>
                 <a:ext uri="{FF2B5EF4-FFF2-40B4-BE49-F238E27FC236}">
-                  <a16:creationId xmlns="" xmlns:a16="http://schemas.microsoft.com/office/drawing/2014/main" id="{7D08133C-45B9-48D9-880F-20FA995CE187}"/>
+                  <a16:creationId xmlns:a16="http://schemas.microsoft.com/office/drawing/2014/main" id="{7D08133C-45B9-48D9-880F-20FA995CE187}"/>
                 </a:ext>
               </a:extLst>
             </p:cNvPr>
@@ -16419,7 +16467,7 @@
               <p:cNvPr id="614" name="타원 613">
                 <a:extLst>
                   <a:ext uri="{FF2B5EF4-FFF2-40B4-BE49-F238E27FC236}">
-                    <a16:creationId xmlns="" xmlns:a16="http://schemas.microsoft.com/office/drawing/2014/main" id="{34311F37-07E7-49D6-ABA2-0D95D9D67C36}"/>
+                    <a16:creationId xmlns:a16="http://schemas.microsoft.com/office/drawing/2014/main" id="{34311F37-07E7-49D6-ABA2-0D95D9D67C36}"/>
                   </a:ext>
                 </a:extLst>
               </p:cNvPr>
@@ -16477,7 +16525,7 @@
               <p:cNvPr id="615" name="TextBox 614">
                 <a:extLst>
                   <a:ext uri="{FF2B5EF4-FFF2-40B4-BE49-F238E27FC236}">
-                    <a16:creationId xmlns="" xmlns:a16="http://schemas.microsoft.com/office/drawing/2014/main" id="{A9E47B76-5905-42B0-AC40-69A8FAAE4FA5}"/>
+                    <a16:creationId xmlns:a16="http://schemas.microsoft.com/office/drawing/2014/main" id="{A9E47B76-5905-42B0-AC40-69A8FAAE4FA5}"/>
                   </a:ext>
                 </a:extLst>
               </p:cNvPr>
@@ -16528,13 +16576,6 @@
   <p:clrMapOvr>
     <a:masterClrMapping/>
   </p:clrMapOvr>
-  <p:timing>
-    <p:tnLst>
-      <p:par>
-        <p:cTn id="1" dur="indefinite" restart="never" nodeType="tmRoot"/>
-      </p:par>
-    </p:tnLst>
-  </p:timing>
 </p:sld>
 </file>
 
@@ -16560,7 +16601,7 @@
           <p:cNvPr id="4" name="사각형: 둥근 모서리 1">
             <a:extLst>
               <a:ext uri="{FF2B5EF4-FFF2-40B4-BE49-F238E27FC236}">
-                <a16:creationId xmlns="" xmlns:a16="http://schemas.microsoft.com/office/drawing/2014/main" id="{440AAC75-CCCD-42C5-A719-078A6B06078F}"/>
+                <a16:creationId xmlns:a16="http://schemas.microsoft.com/office/drawing/2014/main" id="{440AAC75-CCCD-42C5-A719-078A6B06078F}"/>
               </a:ext>
             </a:extLst>
           </p:cNvPr>
@@ -16607,11 +16648,7 @@
             <a:pPr algn="ctr"/>
             <a:r>
               <a:rPr lang="en-US" altLang="ko-KR" dirty="0"/>
-              <a:t>Stage </a:t>
-            </a:r>
-            <a:r>
-              <a:rPr lang="en-US" altLang="ko-KR" dirty="0" smtClean="0"/>
-              <a:t>L2</a:t>
+              <a:t>Stage L2</a:t>
             </a:r>
             <a:endParaRPr lang="ko-KR" altLang="en-US" dirty="0"/>
           </a:p>
@@ -16622,7 +16659,7 @@
           <p:cNvPr id="6" name="직선 연결선 5">
             <a:extLst>
               <a:ext uri="{FF2B5EF4-FFF2-40B4-BE49-F238E27FC236}">
-                <a16:creationId xmlns="" xmlns:a16="http://schemas.microsoft.com/office/drawing/2014/main" id="{4CB4DB58-32B9-4FE8-87D2-2E8715947E96}"/>
+                <a16:creationId xmlns:a16="http://schemas.microsoft.com/office/drawing/2014/main" id="{4CB4DB58-32B9-4FE8-87D2-2E8715947E96}"/>
               </a:ext>
             </a:extLst>
           </p:cNvPr>
@@ -16677,7 +16714,7 @@
             <p:cNvPr id="10" name="그룹 9">
               <a:extLst>
                 <a:ext uri="{FF2B5EF4-FFF2-40B4-BE49-F238E27FC236}">
-                  <a16:creationId xmlns="" xmlns:a16="http://schemas.microsoft.com/office/drawing/2014/main" id="{76DABCB2-673C-4C20-9D8C-3D34F879882E}"/>
+                  <a16:creationId xmlns:a16="http://schemas.microsoft.com/office/drawing/2014/main" id="{76DABCB2-673C-4C20-9D8C-3D34F879882E}"/>
                 </a:ext>
               </a:extLst>
             </p:cNvPr>
@@ -16697,7 +16734,7 @@
               <p:cNvPr id="24" name="직사각형 23">
                 <a:extLst>
                   <a:ext uri="{FF2B5EF4-FFF2-40B4-BE49-F238E27FC236}">
-                    <a16:creationId xmlns="" xmlns:a16="http://schemas.microsoft.com/office/drawing/2014/main" id="{A9ABBA21-5911-4FDC-94D2-91C348241B8C}"/>
+                    <a16:creationId xmlns:a16="http://schemas.microsoft.com/office/drawing/2014/main" id="{A9ABBA21-5911-4FDC-94D2-91C348241B8C}"/>
                   </a:ext>
                 </a:extLst>
               </p:cNvPr>
@@ -16852,7 +16889,7 @@
               <p:cNvPr id="25" name="직사각형 24">
                 <a:extLst>
                   <a:ext uri="{FF2B5EF4-FFF2-40B4-BE49-F238E27FC236}">
-                    <a16:creationId xmlns="" xmlns:a16="http://schemas.microsoft.com/office/drawing/2014/main" id="{81A93B56-CCFB-40B5-85A9-0D17501E6DFB}"/>
+                    <a16:creationId xmlns:a16="http://schemas.microsoft.com/office/drawing/2014/main" id="{81A93B56-CCFB-40B5-85A9-0D17501E6DFB}"/>
                   </a:ext>
                 </a:extLst>
               </p:cNvPr>
@@ -17008,7 +17045,7 @@
             <p:cNvPr id="11" name="그룹 10">
               <a:extLst>
                 <a:ext uri="{FF2B5EF4-FFF2-40B4-BE49-F238E27FC236}">
-                  <a16:creationId xmlns="" xmlns:a16="http://schemas.microsoft.com/office/drawing/2014/main" id="{918917CD-BBE8-4F8A-811B-58EB1750CED4}"/>
+                  <a16:creationId xmlns:a16="http://schemas.microsoft.com/office/drawing/2014/main" id="{918917CD-BBE8-4F8A-811B-58EB1750CED4}"/>
                 </a:ext>
               </a:extLst>
             </p:cNvPr>
@@ -17028,7 +17065,7 @@
               <p:cNvPr id="12" name="TextBox 6">
                 <a:extLst>
                   <a:ext uri="{FF2B5EF4-FFF2-40B4-BE49-F238E27FC236}">
-                    <a16:creationId xmlns="" xmlns:a16="http://schemas.microsoft.com/office/drawing/2014/main" id="{5A8BA3B6-06BC-4840-B7C0-10C6F253D1FB}"/>
+                    <a16:creationId xmlns:a16="http://schemas.microsoft.com/office/drawing/2014/main" id="{5A8BA3B6-06BC-4840-B7C0-10C6F253D1FB}"/>
                   </a:ext>
                 </a:extLst>
               </p:cNvPr>
@@ -17158,7 +17195,7 @@
               <p:cNvPr id="13" name="TextBox 7">
                 <a:extLst>
                   <a:ext uri="{FF2B5EF4-FFF2-40B4-BE49-F238E27FC236}">
-                    <a16:creationId xmlns="" xmlns:a16="http://schemas.microsoft.com/office/drawing/2014/main" id="{80504186-EF68-473C-9453-961301A14772}"/>
+                    <a16:creationId xmlns:a16="http://schemas.microsoft.com/office/drawing/2014/main" id="{80504186-EF68-473C-9453-961301A14772}"/>
                   </a:ext>
                 </a:extLst>
               </p:cNvPr>
@@ -17276,7 +17313,7 @@
               </a:lstStyle>
               <a:p>
                 <a:r>
-                  <a:rPr lang="en-US" altLang="ko-KR" sz="1400" dirty="0" smtClean="0"/>
+                  <a:rPr lang="en-US" altLang="ko-KR" sz="1400" dirty="0"/>
                   <a:t>3m</a:t>
                 </a:r>
                 <a:endParaRPr lang="ko-KR" altLang="en-US" sz="1400" dirty="0"/>
@@ -17288,7 +17325,7 @@
               <p:cNvPr id="18" name="TextBox 12">
                 <a:extLst>
                   <a:ext uri="{FF2B5EF4-FFF2-40B4-BE49-F238E27FC236}">
-                    <a16:creationId xmlns="" xmlns:a16="http://schemas.microsoft.com/office/drawing/2014/main" id="{FF5CFF28-F925-4379-BC3C-70773494DFD5}"/>
+                    <a16:creationId xmlns:a16="http://schemas.microsoft.com/office/drawing/2014/main" id="{FF5CFF28-F925-4379-BC3C-70773494DFD5}"/>
                   </a:ext>
                 </a:extLst>
               </p:cNvPr>
@@ -17418,7 +17455,7 @@
               <p:cNvPr id="19" name="TextBox 13">
                 <a:extLst>
                   <a:ext uri="{FF2B5EF4-FFF2-40B4-BE49-F238E27FC236}">
-                    <a16:creationId xmlns="" xmlns:a16="http://schemas.microsoft.com/office/drawing/2014/main" id="{323E0303-92EA-4E53-9580-4733CDDB3E1B}"/>
+                    <a16:creationId xmlns:a16="http://schemas.microsoft.com/office/drawing/2014/main" id="{323E0303-92EA-4E53-9580-4733CDDB3E1B}"/>
                   </a:ext>
                 </a:extLst>
               </p:cNvPr>
@@ -17550,7 +17587,7 @@
           <p:cNvPr id="9" name="TextBox 8">
             <a:extLst>
               <a:ext uri="{FF2B5EF4-FFF2-40B4-BE49-F238E27FC236}">
-                <a16:creationId xmlns="" xmlns:a16="http://schemas.microsoft.com/office/drawing/2014/main" id="{44A24A8D-E5C7-4722-B586-FBB53D231F1B}"/>
+                <a16:creationId xmlns:a16="http://schemas.microsoft.com/office/drawing/2014/main" id="{44A24A8D-E5C7-4722-B586-FBB53D231F1B}"/>
               </a:ext>
             </a:extLst>
           </p:cNvPr>
@@ -17575,11 +17612,7 @@
           <a:p>
             <a:r>
               <a:rPr lang="en-US" altLang="ko-KR" dirty="0"/>
-              <a:t>6</a:t>
-            </a:r>
-            <a:r>
-              <a:rPr lang="en-US" altLang="ko-KR" dirty="0" smtClean="0"/>
-              <a:t>g x 12g x 7g  </a:t>
+              <a:t>6g x 12g x 7g  </a:t>
             </a:r>
             <a:endParaRPr lang="ko-KR" altLang="en-US" dirty="0"/>
           </a:p>
@@ -21884,7 +21917,7 @@
             <p:cNvPr id="351" name="그룹 350">
               <a:extLst>
                 <a:ext uri="{FF2B5EF4-FFF2-40B4-BE49-F238E27FC236}">
-                  <a16:creationId xmlns="" xmlns:a16="http://schemas.microsoft.com/office/drawing/2014/main" id="{7D08133C-45B9-48D9-880F-20FA995CE187}"/>
+                  <a16:creationId xmlns:a16="http://schemas.microsoft.com/office/drawing/2014/main" id="{7D08133C-45B9-48D9-880F-20FA995CE187}"/>
                 </a:ext>
               </a:extLst>
             </p:cNvPr>
@@ -21904,7 +21937,7 @@
               <p:cNvPr id="352" name="타원 351">
                 <a:extLst>
                   <a:ext uri="{FF2B5EF4-FFF2-40B4-BE49-F238E27FC236}">
-                    <a16:creationId xmlns="" xmlns:a16="http://schemas.microsoft.com/office/drawing/2014/main" id="{34311F37-07E7-49D6-ABA2-0D95D9D67C36}"/>
+                    <a16:creationId xmlns:a16="http://schemas.microsoft.com/office/drawing/2014/main" id="{34311F37-07E7-49D6-ABA2-0D95D9D67C36}"/>
                   </a:ext>
                 </a:extLst>
               </p:cNvPr>
@@ -21962,7 +21995,7 @@
               <p:cNvPr id="353" name="TextBox 352">
                 <a:extLst>
                   <a:ext uri="{FF2B5EF4-FFF2-40B4-BE49-F238E27FC236}">
-                    <a16:creationId xmlns="" xmlns:a16="http://schemas.microsoft.com/office/drawing/2014/main" id="{A9E47B76-5905-42B0-AC40-69A8FAAE4FA5}"/>
+                    <a16:creationId xmlns:a16="http://schemas.microsoft.com/office/drawing/2014/main" id="{A9E47B76-5905-42B0-AC40-69A8FAAE4FA5}"/>
                   </a:ext>
                 </a:extLst>
               </p:cNvPr>
@@ -22013,13 +22046,6 @@
   <p:clrMapOvr>
     <a:masterClrMapping/>
   </p:clrMapOvr>
-  <p:timing>
-    <p:tnLst>
-      <p:par>
-        <p:cTn id="1" dur="indefinite" restart="never" nodeType="tmRoot"/>
-      </p:par>
-    </p:tnLst>
-  </p:timing>
 </p:sld>
 </file>
 
@@ -22045,7 +22071,7 @@
           <p:cNvPr id="4" name="사각형: 둥근 모서리 1">
             <a:extLst>
               <a:ext uri="{FF2B5EF4-FFF2-40B4-BE49-F238E27FC236}">
-                <a16:creationId xmlns="" xmlns:a16="http://schemas.microsoft.com/office/drawing/2014/main" id="{440AAC75-CCCD-42C5-A719-078A6B06078F}"/>
+                <a16:creationId xmlns:a16="http://schemas.microsoft.com/office/drawing/2014/main" id="{440AAC75-CCCD-42C5-A719-078A6B06078F}"/>
               </a:ext>
             </a:extLst>
           </p:cNvPr>
@@ -22092,11 +22118,7 @@
             <a:pPr algn="ctr"/>
             <a:r>
               <a:rPr lang="en-US" altLang="ko-KR" dirty="0"/>
-              <a:t>Stage </a:t>
-            </a:r>
-            <a:r>
-              <a:rPr lang="en-US" altLang="ko-KR" dirty="0" smtClean="0"/>
-              <a:t>L3</a:t>
+              <a:t>Stage L3</a:t>
             </a:r>
             <a:endParaRPr lang="ko-KR" altLang="en-US" dirty="0"/>
           </a:p>
@@ -22107,7 +22129,7 @@
           <p:cNvPr id="6" name="직선 연결선 5">
             <a:extLst>
               <a:ext uri="{FF2B5EF4-FFF2-40B4-BE49-F238E27FC236}">
-                <a16:creationId xmlns="" xmlns:a16="http://schemas.microsoft.com/office/drawing/2014/main" id="{4CB4DB58-32B9-4FE8-87D2-2E8715947E96}"/>
+                <a16:creationId xmlns:a16="http://schemas.microsoft.com/office/drawing/2014/main" id="{4CB4DB58-32B9-4FE8-87D2-2E8715947E96}"/>
               </a:ext>
             </a:extLst>
           </p:cNvPr>
@@ -22162,7 +22184,7 @@
             <p:cNvPr id="10" name="그룹 9">
               <a:extLst>
                 <a:ext uri="{FF2B5EF4-FFF2-40B4-BE49-F238E27FC236}">
-                  <a16:creationId xmlns="" xmlns:a16="http://schemas.microsoft.com/office/drawing/2014/main" id="{76DABCB2-673C-4C20-9D8C-3D34F879882E}"/>
+                  <a16:creationId xmlns:a16="http://schemas.microsoft.com/office/drawing/2014/main" id="{76DABCB2-673C-4C20-9D8C-3D34F879882E}"/>
                 </a:ext>
               </a:extLst>
             </p:cNvPr>
@@ -22182,7 +22204,7 @@
               <p:cNvPr id="24" name="직사각형 23">
                 <a:extLst>
                   <a:ext uri="{FF2B5EF4-FFF2-40B4-BE49-F238E27FC236}">
-                    <a16:creationId xmlns="" xmlns:a16="http://schemas.microsoft.com/office/drawing/2014/main" id="{A9ABBA21-5911-4FDC-94D2-91C348241B8C}"/>
+                    <a16:creationId xmlns:a16="http://schemas.microsoft.com/office/drawing/2014/main" id="{A9ABBA21-5911-4FDC-94D2-91C348241B8C}"/>
                   </a:ext>
                 </a:extLst>
               </p:cNvPr>
@@ -22337,7 +22359,7 @@
               <p:cNvPr id="25" name="직사각형 24">
                 <a:extLst>
                   <a:ext uri="{FF2B5EF4-FFF2-40B4-BE49-F238E27FC236}">
-                    <a16:creationId xmlns="" xmlns:a16="http://schemas.microsoft.com/office/drawing/2014/main" id="{81A93B56-CCFB-40B5-85A9-0D17501E6DFB}"/>
+                    <a16:creationId xmlns:a16="http://schemas.microsoft.com/office/drawing/2014/main" id="{81A93B56-CCFB-40B5-85A9-0D17501E6DFB}"/>
                   </a:ext>
                 </a:extLst>
               </p:cNvPr>
@@ -22493,7 +22515,7 @@
             <p:cNvPr id="11" name="그룹 10">
               <a:extLst>
                 <a:ext uri="{FF2B5EF4-FFF2-40B4-BE49-F238E27FC236}">
-                  <a16:creationId xmlns="" xmlns:a16="http://schemas.microsoft.com/office/drawing/2014/main" id="{918917CD-BBE8-4F8A-811B-58EB1750CED4}"/>
+                  <a16:creationId xmlns:a16="http://schemas.microsoft.com/office/drawing/2014/main" id="{918917CD-BBE8-4F8A-811B-58EB1750CED4}"/>
                 </a:ext>
               </a:extLst>
             </p:cNvPr>
@@ -22513,7 +22535,7 @@
               <p:cNvPr id="12" name="TextBox 6">
                 <a:extLst>
                   <a:ext uri="{FF2B5EF4-FFF2-40B4-BE49-F238E27FC236}">
-                    <a16:creationId xmlns="" xmlns:a16="http://schemas.microsoft.com/office/drawing/2014/main" id="{5A8BA3B6-06BC-4840-B7C0-10C6F253D1FB}"/>
+                    <a16:creationId xmlns:a16="http://schemas.microsoft.com/office/drawing/2014/main" id="{5A8BA3B6-06BC-4840-B7C0-10C6F253D1FB}"/>
                   </a:ext>
                 </a:extLst>
               </p:cNvPr>
@@ -22643,7 +22665,7 @@
               <p:cNvPr id="13" name="TextBox 7">
                 <a:extLst>
                   <a:ext uri="{FF2B5EF4-FFF2-40B4-BE49-F238E27FC236}">
-                    <a16:creationId xmlns="" xmlns:a16="http://schemas.microsoft.com/office/drawing/2014/main" id="{80504186-EF68-473C-9453-961301A14772}"/>
+                    <a16:creationId xmlns:a16="http://schemas.microsoft.com/office/drawing/2014/main" id="{80504186-EF68-473C-9453-961301A14772}"/>
                   </a:ext>
                 </a:extLst>
               </p:cNvPr>
@@ -22761,7 +22783,7 @@
               </a:lstStyle>
               <a:p>
                 <a:r>
-                  <a:rPr lang="en-US" altLang="ko-KR" sz="1400" dirty="0" smtClean="0"/>
+                  <a:rPr lang="en-US" altLang="ko-KR" sz="1400" dirty="0"/>
                   <a:t>2m</a:t>
                 </a:r>
                 <a:endParaRPr lang="ko-KR" altLang="en-US" sz="1400" dirty="0"/>
@@ -22773,7 +22795,7 @@
               <p:cNvPr id="18" name="TextBox 12">
                 <a:extLst>
                   <a:ext uri="{FF2B5EF4-FFF2-40B4-BE49-F238E27FC236}">
-                    <a16:creationId xmlns="" xmlns:a16="http://schemas.microsoft.com/office/drawing/2014/main" id="{FF5CFF28-F925-4379-BC3C-70773494DFD5}"/>
+                    <a16:creationId xmlns:a16="http://schemas.microsoft.com/office/drawing/2014/main" id="{FF5CFF28-F925-4379-BC3C-70773494DFD5}"/>
                   </a:ext>
                 </a:extLst>
               </p:cNvPr>
@@ -22903,7 +22925,7 @@
               <p:cNvPr id="19" name="TextBox 13">
                 <a:extLst>
                   <a:ext uri="{FF2B5EF4-FFF2-40B4-BE49-F238E27FC236}">
-                    <a16:creationId xmlns="" xmlns:a16="http://schemas.microsoft.com/office/drawing/2014/main" id="{323E0303-92EA-4E53-9580-4733CDDB3E1B}"/>
+                    <a16:creationId xmlns:a16="http://schemas.microsoft.com/office/drawing/2014/main" id="{323E0303-92EA-4E53-9580-4733CDDB3E1B}"/>
                   </a:ext>
                 </a:extLst>
               </p:cNvPr>
@@ -23035,7 +23057,7 @@
           <p:cNvPr id="9" name="TextBox 8">
             <a:extLst>
               <a:ext uri="{FF2B5EF4-FFF2-40B4-BE49-F238E27FC236}">
-                <a16:creationId xmlns="" xmlns:a16="http://schemas.microsoft.com/office/drawing/2014/main" id="{44A24A8D-E5C7-4722-B586-FBB53D231F1B}"/>
+                <a16:creationId xmlns:a16="http://schemas.microsoft.com/office/drawing/2014/main" id="{44A24A8D-E5C7-4722-B586-FBB53D231F1B}"/>
               </a:ext>
             </a:extLst>
           </p:cNvPr>
@@ -23060,19 +23082,7 @@
           <a:p>
             <a:r>
               <a:rPr lang="en-US" altLang="ko-KR" dirty="0"/>
-              <a:t>6</a:t>
-            </a:r>
-            <a:r>
-              <a:rPr lang="en-US" altLang="ko-KR" dirty="0" smtClean="0"/>
-              <a:t>g x 14g x </a:t>
-            </a:r>
-            <a:r>
-              <a:rPr lang="en-US" altLang="ko-KR" dirty="0"/>
-              <a:t>6</a:t>
-            </a:r>
-            <a:r>
-              <a:rPr lang="en-US" altLang="ko-KR" dirty="0" smtClean="0"/>
-              <a:t>g  </a:t>
+              <a:t>6g x 14g x 6g  </a:t>
             </a:r>
             <a:endParaRPr lang="ko-KR" altLang="en-US" dirty="0"/>
           </a:p>
@@ -27566,7 +27576,7 @@
           <p:cNvPr id="343" name="그룹 342">
             <a:extLst>
               <a:ext uri="{FF2B5EF4-FFF2-40B4-BE49-F238E27FC236}">
-                <a16:creationId xmlns="" xmlns:a16="http://schemas.microsoft.com/office/drawing/2014/main" id="{595819A7-4F7E-4327-8032-A6C72DE64DB7}"/>
+                <a16:creationId xmlns:a16="http://schemas.microsoft.com/office/drawing/2014/main" id="{595819A7-4F7E-4327-8032-A6C72DE64DB7}"/>
               </a:ext>
             </a:extLst>
           </p:cNvPr>
@@ -27586,7 +27596,7 @@
             <p:cNvPr id="344" name="타원 343">
               <a:extLst>
                 <a:ext uri="{FF2B5EF4-FFF2-40B4-BE49-F238E27FC236}">
-                  <a16:creationId xmlns="" xmlns:a16="http://schemas.microsoft.com/office/drawing/2014/main" id="{EE41D035-AEFA-41DB-BC78-9DBCD635DA9E}"/>
+                  <a16:creationId xmlns:a16="http://schemas.microsoft.com/office/drawing/2014/main" id="{EE41D035-AEFA-41DB-BC78-9DBCD635DA9E}"/>
                 </a:ext>
               </a:extLst>
             </p:cNvPr>
@@ -27644,7 +27654,7 @@
             <p:cNvPr id="345" name="TextBox 344">
               <a:extLst>
                 <a:ext uri="{FF2B5EF4-FFF2-40B4-BE49-F238E27FC236}">
-                  <a16:creationId xmlns="" xmlns:a16="http://schemas.microsoft.com/office/drawing/2014/main" id="{655978A2-9FAF-4296-8002-FFEACA71DBE9}"/>
+                  <a16:creationId xmlns:a16="http://schemas.microsoft.com/office/drawing/2014/main" id="{655978A2-9FAF-4296-8002-FFEACA71DBE9}"/>
                 </a:ext>
               </a:extLst>
             </p:cNvPr>
@@ -27668,7 +27678,7 @@
             <a:lstStyle/>
             <a:p>
               <a:r>
-                <a:rPr lang="en-US" altLang="ko-KR" sz="1200" dirty="0" smtClean="0">
+                <a:rPr lang="en-US" altLang="ko-KR" sz="1200" dirty="0">
                   <a:solidFill>
                     <a:schemeClr val="bg1"/>
                   </a:solidFill>
@@ -27676,7 +27686,7 @@
                 <a:t>15</a:t>
               </a:r>
               <a:r>
-                <a:rPr lang="en-US" altLang="ko-KR" dirty="0" smtClean="0"/>
+                <a:rPr lang="en-US" altLang="ko-KR" dirty="0"/>
                 <a:t>  </a:t>
               </a:r>
               <a:endParaRPr lang="ko-KR" altLang="en-US" dirty="0"/>
@@ -27732,7 +27742,7 @@
           <p:cNvPr id="351" name="그룹 350">
             <a:extLst>
               <a:ext uri="{FF2B5EF4-FFF2-40B4-BE49-F238E27FC236}">
-                <a16:creationId xmlns="" xmlns:a16="http://schemas.microsoft.com/office/drawing/2014/main" id="{7D08133C-45B9-48D9-880F-20FA995CE187}"/>
+                <a16:creationId xmlns:a16="http://schemas.microsoft.com/office/drawing/2014/main" id="{7D08133C-45B9-48D9-880F-20FA995CE187}"/>
               </a:ext>
             </a:extLst>
           </p:cNvPr>
@@ -27752,7 +27762,7 @@
             <p:cNvPr id="352" name="타원 351">
               <a:extLst>
                 <a:ext uri="{FF2B5EF4-FFF2-40B4-BE49-F238E27FC236}">
-                  <a16:creationId xmlns="" xmlns:a16="http://schemas.microsoft.com/office/drawing/2014/main" id="{34311F37-07E7-49D6-ABA2-0D95D9D67C36}"/>
+                  <a16:creationId xmlns:a16="http://schemas.microsoft.com/office/drawing/2014/main" id="{34311F37-07E7-49D6-ABA2-0D95D9D67C36}"/>
                 </a:ext>
               </a:extLst>
             </p:cNvPr>
@@ -27810,7 +27820,7 @@
             <p:cNvPr id="353" name="TextBox 352">
               <a:extLst>
                 <a:ext uri="{FF2B5EF4-FFF2-40B4-BE49-F238E27FC236}">
-                  <a16:creationId xmlns="" xmlns:a16="http://schemas.microsoft.com/office/drawing/2014/main" id="{A9E47B76-5905-42B0-AC40-69A8FAAE4FA5}"/>
+                  <a16:creationId xmlns:a16="http://schemas.microsoft.com/office/drawing/2014/main" id="{A9E47B76-5905-42B0-AC40-69A8FAAE4FA5}"/>
                 </a:ext>
               </a:extLst>
             </p:cNvPr>
@@ -28143,7 +28153,7 @@
           <p:cNvPr id="358" name="그룹 357">
             <a:extLst>
               <a:ext uri="{FF2B5EF4-FFF2-40B4-BE49-F238E27FC236}">
-                <a16:creationId xmlns="" xmlns:a16="http://schemas.microsoft.com/office/drawing/2014/main" id="{595819A7-4F7E-4327-8032-A6C72DE64DB7}"/>
+                <a16:creationId xmlns:a16="http://schemas.microsoft.com/office/drawing/2014/main" id="{595819A7-4F7E-4327-8032-A6C72DE64DB7}"/>
               </a:ext>
             </a:extLst>
           </p:cNvPr>
@@ -28163,7 +28173,7 @@
             <p:cNvPr id="359" name="타원 358">
               <a:extLst>
                 <a:ext uri="{FF2B5EF4-FFF2-40B4-BE49-F238E27FC236}">
-                  <a16:creationId xmlns="" xmlns:a16="http://schemas.microsoft.com/office/drawing/2014/main" id="{EE41D035-AEFA-41DB-BC78-9DBCD635DA9E}"/>
+                  <a16:creationId xmlns:a16="http://schemas.microsoft.com/office/drawing/2014/main" id="{EE41D035-AEFA-41DB-BC78-9DBCD635DA9E}"/>
                 </a:ext>
               </a:extLst>
             </p:cNvPr>
@@ -28221,7 +28231,7 @@
             <p:cNvPr id="360" name="TextBox 359">
               <a:extLst>
                 <a:ext uri="{FF2B5EF4-FFF2-40B4-BE49-F238E27FC236}">
-                  <a16:creationId xmlns="" xmlns:a16="http://schemas.microsoft.com/office/drawing/2014/main" id="{655978A2-9FAF-4296-8002-FFEACA71DBE9}"/>
+                  <a16:creationId xmlns:a16="http://schemas.microsoft.com/office/drawing/2014/main" id="{655978A2-9FAF-4296-8002-FFEACA71DBE9}"/>
                 </a:ext>
               </a:extLst>
             </p:cNvPr>
@@ -28245,7 +28255,7 @@
             <a:lstStyle/>
             <a:p>
               <a:r>
-                <a:rPr lang="en-US" altLang="ko-KR" sz="1200" dirty="0" smtClean="0">
+                <a:rPr lang="en-US" altLang="ko-KR" sz="1200" dirty="0">
                   <a:solidFill>
                     <a:schemeClr val="bg1"/>
                   </a:solidFill>
@@ -28253,7 +28263,7 @@
                 <a:t>11</a:t>
               </a:r>
               <a:r>
-                <a:rPr lang="en-US" altLang="ko-KR" dirty="0" smtClean="0"/>
+                <a:rPr lang="en-US" altLang="ko-KR" dirty="0"/>
                 <a:t>  </a:t>
               </a:r>
               <a:endParaRPr lang="ko-KR" altLang="en-US" dirty="0"/>
@@ -28399,13 +28409,6 @@
   <p:clrMapOvr>
     <a:masterClrMapping/>
   </p:clrMapOvr>
-  <p:timing>
-    <p:tnLst>
-      <p:par>
-        <p:cTn id="1" dur="indefinite" restart="never" nodeType="tmRoot"/>
-      </p:par>
-    </p:tnLst>
-  </p:timing>
 </p:sld>
 </file>
 
@@ -28431,7 +28434,7 @@
           <p:cNvPr id="4" name="사각형: 둥근 모서리 1">
             <a:extLst>
               <a:ext uri="{FF2B5EF4-FFF2-40B4-BE49-F238E27FC236}">
-                <a16:creationId xmlns="" xmlns:a16="http://schemas.microsoft.com/office/drawing/2014/main" id="{440AAC75-CCCD-42C5-A719-078A6B06078F}"/>
+                <a16:creationId xmlns:a16="http://schemas.microsoft.com/office/drawing/2014/main" id="{440AAC75-CCCD-42C5-A719-078A6B06078F}"/>
               </a:ext>
             </a:extLst>
           </p:cNvPr>
@@ -28478,11 +28481,7 @@
             <a:pPr algn="ctr"/>
             <a:r>
               <a:rPr lang="en-US" altLang="ko-KR" dirty="0"/>
-              <a:t>Stage </a:t>
-            </a:r>
-            <a:r>
-              <a:rPr lang="en-US" altLang="ko-KR" dirty="0" smtClean="0"/>
-              <a:t>L4</a:t>
+              <a:t>Stage L4</a:t>
             </a:r>
             <a:endParaRPr lang="ko-KR" altLang="en-US" dirty="0"/>
           </a:p>
@@ -28493,7 +28492,7 @@
           <p:cNvPr id="6" name="직선 연결선 5">
             <a:extLst>
               <a:ext uri="{FF2B5EF4-FFF2-40B4-BE49-F238E27FC236}">
-                <a16:creationId xmlns="" xmlns:a16="http://schemas.microsoft.com/office/drawing/2014/main" id="{4CB4DB58-32B9-4FE8-87D2-2E8715947E96}"/>
+                <a16:creationId xmlns:a16="http://schemas.microsoft.com/office/drawing/2014/main" id="{4CB4DB58-32B9-4FE8-87D2-2E8715947E96}"/>
               </a:ext>
             </a:extLst>
           </p:cNvPr>
@@ -28548,7 +28547,7 @@
             <p:cNvPr id="10" name="그룹 9">
               <a:extLst>
                 <a:ext uri="{FF2B5EF4-FFF2-40B4-BE49-F238E27FC236}">
-                  <a16:creationId xmlns="" xmlns:a16="http://schemas.microsoft.com/office/drawing/2014/main" id="{76DABCB2-673C-4C20-9D8C-3D34F879882E}"/>
+                  <a16:creationId xmlns:a16="http://schemas.microsoft.com/office/drawing/2014/main" id="{76DABCB2-673C-4C20-9D8C-3D34F879882E}"/>
                 </a:ext>
               </a:extLst>
             </p:cNvPr>
@@ -28568,7 +28567,7 @@
               <p:cNvPr id="24" name="직사각형 23">
                 <a:extLst>
                   <a:ext uri="{FF2B5EF4-FFF2-40B4-BE49-F238E27FC236}">
-                    <a16:creationId xmlns="" xmlns:a16="http://schemas.microsoft.com/office/drawing/2014/main" id="{A9ABBA21-5911-4FDC-94D2-91C348241B8C}"/>
+                    <a16:creationId xmlns:a16="http://schemas.microsoft.com/office/drawing/2014/main" id="{A9ABBA21-5911-4FDC-94D2-91C348241B8C}"/>
                   </a:ext>
                 </a:extLst>
               </p:cNvPr>
@@ -28723,7 +28722,7 @@
               <p:cNvPr id="25" name="직사각형 24">
                 <a:extLst>
                   <a:ext uri="{FF2B5EF4-FFF2-40B4-BE49-F238E27FC236}">
-                    <a16:creationId xmlns="" xmlns:a16="http://schemas.microsoft.com/office/drawing/2014/main" id="{81A93B56-CCFB-40B5-85A9-0D17501E6DFB}"/>
+                    <a16:creationId xmlns:a16="http://schemas.microsoft.com/office/drawing/2014/main" id="{81A93B56-CCFB-40B5-85A9-0D17501E6DFB}"/>
                   </a:ext>
                 </a:extLst>
               </p:cNvPr>
@@ -28879,7 +28878,7 @@
             <p:cNvPr id="11" name="그룹 10">
               <a:extLst>
                 <a:ext uri="{FF2B5EF4-FFF2-40B4-BE49-F238E27FC236}">
-                  <a16:creationId xmlns="" xmlns:a16="http://schemas.microsoft.com/office/drawing/2014/main" id="{918917CD-BBE8-4F8A-811B-58EB1750CED4}"/>
+                  <a16:creationId xmlns:a16="http://schemas.microsoft.com/office/drawing/2014/main" id="{918917CD-BBE8-4F8A-811B-58EB1750CED4}"/>
                 </a:ext>
               </a:extLst>
             </p:cNvPr>
@@ -28899,7 +28898,7 @@
               <p:cNvPr id="12" name="TextBox 6">
                 <a:extLst>
                   <a:ext uri="{FF2B5EF4-FFF2-40B4-BE49-F238E27FC236}">
-                    <a16:creationId xmlns="" xmlns:a16="http://schemas.microsoft.com/office/drawing/2014/main" id="{5A8BA3B6-06BC-4840-B7C0-10C6F253D1FB}"/>
+                    <a16:creationId xmlns:a16="http://schemas.microsoft.com/office/drawing/2014/main" id="{5A8BA3B6-06BC-4840-B7C0-10C6F253D1FB}"/>
                   </a:ext>
                 </a:extLst>
               </p:cNvPr>
@@ -29029,7 +29028,7 @@
               <p:cNvPr id="13" name="TextBox 7">
                 <a:extLst>
                   <a:ext uri="{FF2B5EF4-FFF2-40B4-BE49-F238E27FC236}">
-                    <a16:creationId xmlns="" xmlns:a16="http://schemas.microsoft.com/office/drawing/2014/main" id="{80504186-EF68-473C-9453-961301A14772}"/>
+                    <a16:creationId xmlns:a16="http://schemas.microsoft.com/office/drawing/2014/main" id="{80504186-EF68-473C-9453-961301A14772}"/>
                   </a:ext>
                 </a:extLst>
               </p:cNvPr>
@@ -29148,11 +29147,7 @@
               <a:p>
                 <a:r>
                   <a:rPr lang="en-US" altLang="ko-KR" sz="1400" dirty="0"/>
-                  <a:t>6</a:t>
-                </a:r>
-                <a:r>
-                  <a:rPr lang="en-US" altLang="ko-KR" sz="1400" dirty="0" smtClean="0"/>
-                  <a:t>m</a:t>
+                  <a:t>6m</a:t>
                 </a:r>
                 <a:endParaRPr lang="ko-KR" altLang="en-US" sz="1400" dirty="0"/>
               </a:p>
@@ -29163,7 +29158,7 @@
               <p:cNvPr id="18" name="TextBox 12">
                 <a:extLst>
                   <a:ext uri="{FF2B5EF4-FFF2-40B4-BE49-F238E27FC236}">
-                    <a16:creationId xmlns="" xmlns:a16="http://schemas.microsoft.com/office/drawing/2014/main" id="{FF5CFF28-F925-4379-BC3C-70773494DFD5}"/>
+                    <a16:creationId xmlns:a16="http://schemas.microsoft.com/office/drawing/2014/main" id="{FF5CFF28-F925-4379-BC3C-70773494DFD5}"/>
                   </a:ext>
                 </a:extLst>
               </p:cNvPr>
@@ -29293,7 +29288,7 @@
               <p:cNvPr id="19" name="TextBox 13">
                 <a:extLst>
                   <a:ext uri="{FF2B5EF4-FFF2-40B4-BE49-F238E27FC236}">
-                    <a16:creationId xmlns="" xmlns:a16="http://schemas.microsoft.com/office/drawing/2014/main" id="{323E0303-92EA-4E53-9580-4733CDDB3E1B}"/>
+                    <a16:creationId xmlns:a16="http://schemas.microsoft.com/office/drawing/2014/main" id="{323E0303-92EA-4E53-9580-4733CDDB3E1B}"/>
                   </a:ext>
                 </a:extLst>
               </p:cNvPr>
@@ -29425,7 +29420,7 @@
           <p:cNvPr id="9" name="TextBox 8">
             <a:extLst>
               <a:ext uri="{FF2B5EF4-FFF2-40B4-BE49-F238E27FC236}">
-                <a16:creationId xmlns="" xmlns:a16="http://schemas.microsoft.com/office/drawing/2014/main" id="{44A24A8D-E5C7-4722-B586-FBB53D231F1B}"/>
+                <a16:creationId xmlns:a16="http://schemas.microsoft.com/office/drawing/2014/main" id="{44A24A8D-E5C7-4722-B586-FBB53D231F1B}"/>
               </a:ext>
             </a:extLst>
           </p:cNvPr>
@@ -29449,7 +29444,7 @@
           <a:lstStyle/>
           <a:p>
             <a:r>
-              <a:rPr lang="en-US" altLang="ko-KR" dirty="0" smtClean="0"/>
+              <a:rPr lang="en-US" altLang="ko-KR" dirty="0"/>
               <a:t>12g x 14g x 10g  </a:t>
             </a:r>
             <a:endParaRPr lang="ko-KR" altLang="en-US" dirty="0"/>
@@ -29464,7 +29459,7 @@
         </p:nvGrpSpPr>
         <p:grpSpPr>
           <a:xfrm>
-            <a:off x="3805621" y="2343307"/>
+            <a:off x="4030428" y="2441048"/>
             <a:ext cx="3199852" cy="3939111"/>
             <a:chOff x="2351862" y="2065475"/>
             <a:chExt cx="3199852" cy="3939111"/>
@@ -39256,7 +39251,7 @@
             <p:cNvPr id="380" name="그룹 379">
               <a:extLst>
                 <a:ext uri="{FF2B5EF4-FFF2-40B4-BE49-F238E27FC236}">
-                  <a16:creationId xmlns="" xmlns:a16="http://schemas.microsoft.com/office/drawing/2014/main" id="{7D08133C-45B9-48D9-880F-20FA995CE187}"/>
+                  <a16:creationId xmlns:a16="http://schemas.microsoft.com/office/drawing/2014/main" id="{7D08133C-45B9-48D9-880F-20FA995CE187}"/>
                 </a:ext>
               </a:extLst>
             </p:cNvPr>
@@ -39276,7 +39271,7 @@
               <p:cNvPr id="381" name="타원 380">
                 <a:extLst>
                   <a:ext uri="{FF2B5EF4-FFF2-40B4-BE49-F238E27FC236}">
-                    <a16:creationId xmlns="" xmlns:a16="http://schemas.microsoft.com/office/drawing/2014/main" id="{34311F37-07E7-49D6-ABA2-0D95D9D67C36}"/>
+                    <a16:creationId xmlns:a16="http://schemas.microsoft.com/office/drawing/2014/main" id="{34311F37-07E7-49D6-ABA2-0D95D9D67C36}"/>
                   </a:ext>
                 </a:extLst>
               </p:cNvPr>
@@ -39334,7 +39329,7 @@
               <p:cNvPr id="382" name="TextBox 381">
                 <a:extLst>
                   <a:ext uri="{FF2B5EF4-FFF2-40B4-BE49-F238E27FC236}">
-                    <a16:creationId xmlns="" xmlns:a16="http://schemas.microsoft.com/office/drawing/2014/main" id="{A9E47B76-5905-42B0-AC40-69A8FAAE4FA5}"/>
+                    <a16:creationId xmlns:a16="http://schemas.microsoft.com/office/drawing/2014/main" id="{A9E47B76-5905-42B0-AC40-69A8FAAE4FA5}"/>
                   </a:ext>
                 </a:extLst>
               </p:cNvPr>
@@ -39398,52 +39393,52 @@
           <a:lstStyle/>
           <a:p>
             <a:r>
-              <a:rPr lang="ko-KR" altLang="en-US" sz="1400" dirty="0" smtClean="0"/>
+              <a:rPr lang="ko-KR" altLang="en-US" sz="1400" dirty="0"/>
               <a:t>맵 설명 </a:t>
             </a:r>
             <a:r>
-              <a:rPr lang="en-US" altLang="ko-KR" sz="1400" dirty="0" smtClean="0"/>
+              <a:rPr lang="en-US" altLang="ko-KR" sz="1400" dirty="0"/>
               <a:t>: </a:t>
             </a:r>
             <a:r>
-              <a:rPr lang="ko-KR" altLang="en-US" sz="1400" dirty="0" smtClean="0"/>
+              <a:rPr lang="ko-KR" altLang="en-US" sz="1400" dirty="0"/>
               <a:t>빨간 벽</a:t>
             </a:r>
             <a:r>
-              <a:rPr lang="en-US" altLang="ko-KR" sz="1400" dirty="0" smtClean="0"/>
+              <a:rPr lang="en-US" altLang="ko-KR" sz="1400" dirty="0"/>
               <a:t>, </a:t>
             </a:r>
             <a:r>
-              <a:rPr lang="ko-KR" altLang="en-US" sz="1400" dirty="0" smtClean="0"/>
+              <a:rPr lang="ko-KR" altLang="en-US" sz="1400" dirty="0"/>
               <a:t>벽과 붙어있는 오브젝트들이 화살표 방향으로 움직임</a:t>
             </a:r>
             <a:r>
-              <a:rPr lang="en-US" altLang="ko-KR" sz="1400" dirty="0" smtClean="0"/>
+              <a:rPr lang="en-US" altLang="ko-KR" sz="1400" dirty="0"/>
               <a:t>.</a:t>
             </a:r>
           </a:p>
           <a:p>
             <a:r>
-              <a:rPr lang="ko-KR" altLang="en-US" sz="1400" dirty="0" smtClean="0"/>
+              <a:rPr lang="ko-KR" altLang="en-US" sz="1400" dirty="0"/>
               <a:t>움직이다 빨간 점선부분에 도달하면 빨간 벽에 닿은 오브젝트는 모두 삭제됨</a:t>
             </a:r>
-            <a:endParaRPr lang="en-US" altLang="ko-KR" sz="1400" dirty="0" smtClean="0"/>
+            <a:endParaRPr lang="en-US" altLang="ko-KR" sz="1400" dirty="0"/>
           </a:p>
           <a:p>
             <a:r>
-              <a:rPr lang="ko-KR" altLang="en-US" sz="1400" dirty="0" smtClean="0"/>
+              <a:rPr lang="ko-KR" altLang="en-US" sz="1400" dirty="0"/>
               <a:t>플레이어가 닿을 경우 사망처리</a:t>
             </a:r>
             <a:r>
-              <a:rPr lang="en-US" altLang="ko-KR" sz="1400" dirty="0" smtClean="0"/>
+              <a:rPr lang="en-US" altLang="ko-KR" sz="1400" dirty="0"/>
               <a:t>, </a:t>
             </a:r>
             <a:r>
-              <a:rPr lang="ko-KR" altLang="en-US" sz="1400" dirty="0" smtClean="0"/>
+              <a:rPr lang="ko-KR" altLang="en-US" sz="1400" dirty="0"/>
               <a:t>스테이지 재 시작</a:t>
             </a:r>
             <a:r>
-              <a:rPr lang="en-US" altLang="ko-KR" sz="1400" dirty="0" smtClean="0"/>
+              <a:rPr lang="en-US" altLang="ko-KR" sz="1400" dirty="0"/>
               <a:t> </a:t>
             </a:r>
             <a:endParaRPr lang="ko-KR" altLang="en-US" sz="1400" dirty="0"/>
@@ -39509,7 +39504,7 @@
           <a:lstStyle/>
           <a:p>
             <a:r>
-              <a:rPr lang="ko-KR" altLang="en-US" sz="1200" dirty="0" smtClean="0">
+              <a:rPr lang="ko-KR" altLang="en-US" sz="1200" dirty="0">
                 <a:solidFill>
                   <a:schemeClr val="tx1">
                     <a:lumMod val="50000"/>
@@ -39520,7 +39515,7 @@
               <a:t>벽이 이동하는 속도는 일단 </a:t>
             </a:r>
             <a:r>
-              <a:rPr lang="en-US" altLang="ko-KR" sz="1200" dirty="0" smtClean="0">
+              <a:rPr lang="en-US" altLang="ko-KR" sz="1200" dirty="0">
                 <a:solidFill>
                   <a:schemeClr val="tx1">
                     <a:lumMod val="50000"/>
@@ -39531,7 +39526,7 @@
               <a:t>0.5m/s</a:t>
             </a:r>
             <a:r>
-              <a:rPr lang="ko-KR" altLang="en-US" sz="1200" dirty="0" smtClean="0">
+              <a:rPr lang="ko-KR" altLang="en-US" sz="1200" dirty="0">
                 <a:solidFill>
                   <a:schemeClr val="tx1">
                     <a:lumMod val="50000"/>
@@ -39542,7 +39537,7 @@
               <a:t>로 해주시고</a:t>
             </a:r>
             <a:r>
-              <a:rPr lang="en-US" altLang="ko-KR" sz="1200" dirty="0" smtClean="0">
+              <a:rPr lang="en-US" altLang="ko-KR" sz="1200" dirty="0">
                 <a:solidFill>
                   <a:schemeClr val="tx1">
                     <a:lumMod val="50000"/>
@@ -39553,7 +39548,7 @@
               <a:t>, </a:t>
             </a:r>
             <a:r>
-              <a:rPr lang="ko-KR" altLang="en-US" sz="1200" dirty="0" smtClean="0">
+              <a:rPr lang="ko-KR" altLang="en-US" sz="1200" dirty="0">
                 <a:solidFill>
                   <a:schemeClr val="tx1">
                     <a:lumMod val="50000"/>
@@ -39564,7 +39559,7 @@
               <a:t>테스트 도중 변경 할 수 있습니다</a:t>
             </a:r>
             <a:r>
-              <a:rPr lang="en-US" altLang="ko-KR" sz="1200" dirty="0" smtClean="0">
+              <a:rPr lang="en-US" altLang="ko-KR" sz="1200" dirty="0">
                 <a:solidFill>
                   <a:schemeClr val="tx1">
                     <a:lumMod val="50000"/>
@@ -39595,13 +39590,6 @@
   <p:clrMapOvr>
     <a:masterClrMapping/>
   </p:clrMapOvr>
-  <p:timing>
-    <p:tnLst>
-      <p:par>
-        <p:cTn id="1" dur="indefinite" restart="never" nodeType="tmRoot"/>
-      </p:par>
-    </p:tnLst>
-  </p:timing>
 </p:sld>
 </file>
 
@@ -39750,57 +39738,53 @@
           <a:lstStyle/>
           <a:p>
             <a:r>
-              <a:rPr lang="ko-KR" altLang="en-US" dirty="0" smtClean="0"/>
+              <a:rPr lang="ko-KR" altLang="en-US" dirty="0"/>
               <a:t>모서리가 아주 살짝 둥근 </a:t>
             </a:r>
             <a:r>
-              <a:rPr lang="ko-KR" altLang="en-US" dirty="0" err="1" smtClean="0"/>
+              <a:rPr lang="ko-KR" altLang="en-US" dirty="0" err="1"/>
               <a:t>큐브의</a:t>
             </a:r>
             <a:r>
-              <a:rPr lang="ko-KR" altLang="en-US" dirty="0" smtClean="0"/>
+              <a:rPr lang="ko-KR" altLang="en-US" dirty="0"/>
               <a:t> 모양</a:t>
             </a:r>
-            <a:endParaRPr lang="en-US" altLang="ko-KR" dirty="0" smtClean="0"/>
+            <a:endParaRPr lang="en-US" altLang="ko-KR" dirty="0"/>
           </a:p>
           <a:p>
             <a:endParaRPr lang="en-US" altLang="ko-KR" dirty="0"/>
           </a:p>
           <a:p>
             <a:r>
-              <a:rPr lang="ko-KR" altLang="en-US" dirty="0" smtClean="0"/>
+              <a:rPr lang="ko-KR" altLang="en-US" dirty="0"/>
               <a:t>반투명</a:t>
             </a:r>
             <a:endParaRPr lang="en-US" altLang="ko-KR" dirty="0"/>
           </a:p>
           <a:p>
-            <a:endParaRPr lang="en-US" altLang="ko-KR" dirty="0" smtClean="0"/>
+            <a:endParaRPr lang="en-US" altLang="ko-KR" dirty="0"/>
           </a:p>
           <a:p>
             <a:r>
-              <a:rPr lang="en-US" altLang="ko-KR" dirty="0" smtClean="0"/>
+              <a:rPr lang="en-US" altLang="ko-KR" dirty="0"/>
               <a:t>B</a:t>
             </a:r>
             <a:r>
-              <a:rPr lang="ko-KR" altLang="en-US" dirty="0" smtClean="0"/>
+              <a:rPr lang="ko-KR" altLang="en-US" dirty="0"/>
               <a:t>타입 오브젝트는 무채색 계열 사용</a:t>
             </a:r>
-            <a:endParaRPr lang="en-US" altLang="ko-KR" dirty="0" smtClean="0"/>
+            <a:endParaRPr lang="en-US" altLang="ko-KR" dirty="0"/>
           </a:p>
           <a:p>
             <a:r>
-              <a:rPr lang="en-US" altLang="ko-KR" dirty="0" smtClean="0"/>
+              <a:rPr lang="en-US" altLang="ko-KR" dirty="0"/>
               <a:t>A</a:t>
             </a:r>
             <a:r>
-              <a:rPr lang="ko-KR" altLang="en-US" dirty="0" smtClean="0"/>
-              <a:t>타입 오브젝트는 채도가 살짝 있는 </a:t>
+              <a:rPr lang="ko-KR" altLang="en-US" dirty="0"/>
+              <a:t>타입 오브젝트는 채도가 살짝 있는 느낌</a:t>
             </a:r>
-            <a:r>
-              <a:rPr lang="ko-KR" altLang="en-US" dirty="0" smtClean="0"/>
-              <a:t>느낌</a:t>
-            </a:r>
-            <a:endParaRPr lang="en-US" altLang="ko-KR" dirty="0" smtClean="0"/>
+            <a:endParaRPr lang="en-US" altLang="ko-KR" dirty="0"/>
           </a:p>
         </p:txBody>
       </p:sp>
@@ -40317,26 +40301,26 @@
           <a:lstStyle/>
           <a:p>
             <a:r>
-              <a:rPr lang="ko-KR" altLang="en-US" dirty="0" smtClean="0"/>
+              <a:rPr lang="ko-KR" altLang="en-US" dirty="0"/>
               <a:t>정제</a:t>
             </a:r>
-            <a:endParaRPr lang="en-US" altLang="ko-KR" dirty="0" smtClean="0"/>
-          </a:p>
-          <a:p>
-            <a:endParaRPr lang="en-US" altLang="ko-KR" dirty="0" smtClean="0"/>
+            <a:endParaRPr lang="en-US" altLang="ko-KR" dirty="0"/>
           </a:p>
           <a:p>
             <a:endParaRPr lang="en-US" altLang="ko-KR" dirty="0"/>
           </a:p>
           <a:p>
-            <a:endParaRPr lang="en-US" altLang="ko-KR" dirty="0" smtClean="0"/>
+            <a:endParaRPr lang="en-US" altLang="ko-KR" dirty="0"/>
+          </a:p>
+          <a:p>
+            <a:endParaRPr lang="en-US" altLang="ko-KR" dirty="0"/>
           </a:p>
           <a:p>
             <a:r>
-              <a:rPr lang="ko-KR" altLang="en-US" dirty="0" err="1" smtClean="0"/>
+              <a:rPr lang="ko-KR" altLang="en-US" dirty="0" err="1"/>
               <a:t>비정제</a:t>
             </a:r>
-            <a:endParaRPr lang="en-US" altLang="ko-KR" dirty="0" smtClean="0"/>
+            <a:endParaRPr lang="en-US" altLang="ko-KR" dirty="0"/>
           </a:p>
         </p:txBody>
       </p:sp>
@@ -40409,18 +40393,18 @@
           <a:lstStyle/>
           <a:p>
             <a:r>
-              <a:rPr lang="en-US" altLang="ko-KR" dirty="0" smtClean="0"/>
+              <a:rPr lang="en-US" altLang="ko-KR" dirty="0"/>
               <a:t>A</a:t>
             </a:r>
             <a:r>
-              <a:rPr lang="ko-KR" altLang="en-US" dirty="0" smtClean="0"/>
+              <a:rPr lang="ko-KR" altLang="en-US" dirty="0"/>
               <a:t>타입 </a:t>
             </a:r>
             <a:r>
-              <a:rPr lang="en-US" altLang="ko-KR" dirty="0" err="1" smtClean="0"/>
+              <a:rPr lang="en-US" altLang="ko-KR" dirty="0" err="1"/>
               <a:t>Obj</a:t>
             </a:r>
-            <a:endParaRPr lang="en-US" altLang="ko-KR" dirty="0" smtClean="0"/>
+            <a:endParaRPr lang="en-US" altLang="ko-KR" dirty="0"/>
           </a:p>
         </p:txBody>
       </p:sp>
@@ -40447,10 +40431,10 @@
           <a:lstStyle/>
           <a:p>
             <a:r>
-              <a:rPr lang="ko-KR" altLang="en-US" dirty="0" smtClean="0"/>
+              <a:rPr lang="ko-KR" altLang="en-US" dirty="0"/>
               <a:t>카인 색상</a:t>
             </a:r>
-            <a:endParaRPr lang="en-US" altLang="ko-KR" dirty="0" smtClean="0"/>
+            <a:endParaRPr lang="en-US" altLang="ko-KR" dirty="0"/>
           </a:p>
         </p:txBody>
       </p:sp>
@@ -41288,7 +41272,7 @@
   <a:extraClrSchemeLst/>
   <a:extLst>
     <a:ext uri="{05A4C25C-085E-4340-85A3-A5531E510DB2}">
-      <thm15:themeFamily xmlns="" xmlns:thm15="http://schemas.microsoft.com/office/thememl/2012/main" name="Office Theme" id="{62F939B6-93AF-4DB8-9C6B-D6C7DFDC589F}" vid="{4A3C46E8-61CC-4603-A589-7422A47A8E4A}"/>
+      <thm15:themeFamily xmlns:thm15="http://schemas.microsoft.com/office/thememl/2012/main" name="Office Theme" id="{62F939B6-93AF-4DB8-9C6B-D6C7DFDC589F}" vid="{4A3C46E8-61CC-4603-A589-7422A47A8E4A}"/>
     </a:ext>
   </a:extLst>
 </a:theme>

</xml_diff>